<commit_message>
Atualização e melhoria da apresentação
</commit_message>
<xml_diff>
--- a/Apresentação/Semana_Universitaria.pptx
+++ b/Apresentação/Semana_Universitaria.pptx
@@ -9,23 +9,27 @@
     <p:sldMasterId id="2147483842" r:id="rId5"/>
   </p:sldMasterIdLst>
   <p:notesMasterIdLst>
-    <p:notesMasterId r:id="rId20"/>
+    <p:notesMasterId r:id="rId24"/>
   </p:notesMasterIdLst>
   <p:sldIdLst>
-    <p:sldId id="256" r:id="rId6"/>
-    <p:sldId id="257" r:id="rId7"/>
-    <p:sldId id="258" r:id="rId8"/>
-    <p:sldId id="262" r:id="rId9"/>
-    <p:sldId id="261" r:id="rId10"/>
-    <p:sldId id="259" r:id="rId11"/>
-    <p:sldId id="260" r:id="rId12"/>
-    <p:sldId id="263" r:id="rId13"/>
-    <p:sldId id="264" r:id="rId14"/>
-    <p:sldId id="265" r:id="rId15"/>
-    <p:sldId id="266" r:id="rId16"/>
-    <p:sldId id="267" r:id="rId17"/>
-    <p:sldId id="268" r:id="rId18"/>
-    <p:sldId id="269" r:id="rId19"/>
+    <p:sldId id="274" r:id="rId6"/>
+    <p:sldId id="272" r:id="rId7"/>
+    <p:sldId id="256" r:id="rId8"/>
+    <p:sldId id="270" r:id="rId9"/>
+    <p:sldId id="273" r:id="rId10"/>
+    <p:sldId id="257" r:id="rId11"/>
+    <p:sldId id="258" r:id="rId12"/>
+    <p:sldId id="262" r:id="rId13"/>
+    <p:sldId id="261" r:id="rId14"/>
+    <p:sldId id="259" r:id="rId15"/>
+    <p:sldId id="260" r:id="rId16"/>
+    <p:sldId id="263" r:id="rId17"/>
+    <p:sldId id="264" r:id="rId18"/>
+    <p:sldId id="265" r:id="rId19"/>
+    <p:sldId id="266" r:id="rId20"/>
+    <p:sldId id="267" r:id="rId21"/>
+    <p:sldId id="268" r:id="rId22"/>
+    <p:sldId id="269" r:id="rId23"/>
   </p:sldIdLst>
   <p:sldSz cx="9144000" cy="6858000" type="screen4x3"/>
   <p:notesSz cx="6858000" cy="9144000"/>
@@ -225,7 +229,7 @@
           <a:p>
             <a:fld id="{9769C277-18B4-3240-B8E0-4E3DFC451D39}" type="datetimeFigureOut">
               <a:rPr lang="en-US" smtClean="0"/>
-              <a:t>10/26/2025</a:t>
+              <a:t>10/28/2025</a:t>
             </a:fld>
             <a:endParaRPr lang="en-US"/>
           </a:p>
@@ -562,7 +566,7 @@
           <a:p>
             <a:fld id="{AD3EC0FD-BE50-5547-BFB5-D4B1B5721DCF}" type="slidenum">
               <a:rPr lang="en-US" smtClean="0"/>
-              <a:t>1</a:t>
+              <a:t>3</a:t>
             </a:fld>
             <a:endParaRPr lang="en-US"/>
           </a:p>
@@ -25625,10 +25629,10 @@
       </p:grpSpPr>
       <p:sp>
         <p:nvSpPr>
-          <p:cNvPr id="2" name="Title 1">
-            <a:extLst>
-              <a:ext uri="{FF2B5EF4-FFF2-40B4-BE49-F238E27FC236}">
-                <a16:creationId xmlns:a16="http://schemas.microsoft.com/office/drawing/2014/main" id="{02724BF9-0242-8747-BB26-263A6FCFEAB1}"/>
+          <p:cNvPr id="5" name="Espaço Reservado para Número de Slide 4">
+            <a:extLst>
+              <a:ext uri="{FF2B5EF4-FFF2-40B4-BE49-F238E27FC236}">
+                <a16:creationId xmlns:a16="http://schemas.microsoft.com/office/drawing/2014/main" id="{C3B69EF7-525D-4265-811F-BF28535E79F0}"/>
               </a:ext>
             </a:extLst>
           </p:cNvPr>
@@ -25636,7 +25640,7 @@
             <a:spLocks noGrp="1"/>
           </p:cNvSpPr>
           <p:nvPr>
-            <p:ph type="ctrTitle"/>
+            <p:ph type="sldNum" sz="quarter" idx="15"/>
           </p:nvPr>
         </p:nvSpPr>
         <p:spPr/>
@@ -25644,47 +25648,97 @@
           <a:bodyPr/>
           <a:lstStyle/>
           <a:p>
-            <a:r>
-              <a:rPr lang="pt-BR" dirty="0"/>
-              <a:t>Filtros QMF</a:t>
-            </a:r>
+            <a:fld id="{A16978B4-287B-0541-9C5D-483DA783F6CF}" type="slidenum">
+              <a:rPr lang="en-US" smtClean="0"/>
+              <a:t>1</a:t>
+            </a:fld>
             <a:endParaRPr lang="en-US" dirty="0"/>
           </a:p>
         </p:txBody>
       </p:sp>
       <p:sp>
         <p:nvSpPr>
-          <p:cNvPr id="3" name="Subtitle 2">
-            <a:extLst>
-              <a:ext uri="{FF2B5EF4-FFF2-40B4-BE49-F238E27FC236}">
-                <a16:creationId xmlns:a16="http://schemas.microsoft.com/office/drawing/2014/main" id="{F39E6E9E-180B-E04D-919D-31130DA62AAF}"/>
-              </a:ext>
-            </a:extLst>
-          </p:cNvPr>
-          <p:cNvSpPr>
-            <a:spLocks noGrp="1"/>
-          </p:cNvSpPr>
-          <p:nvPr>
-            <p:ph type="subTitle" idx="1"/>
-          </p:nvPr>
+          <p:cNvPr id="9" name="Retângulo 8">
+            <a:extLst>
+              <a:ext uri="{FF2B5EF4-FFF2-40B4-BE49-F238E27FC236}">
+                <a16:creationId xmlns:a16="http://schemas.microsoft.com/office/drawing/2014/main" id="{E965D651-33E1-4EAC-8F86-E8FCBDA52C33}"/>
+              </a:ext>
+            </a:extLst>
+          </p:cNvPr>
+          <p:cNvSpPr/>
+          <p:nvPr/>
         </p:nvSpPr>
-        <p:spPr/>
+        <p:spPr>
+          <a:xfrm>
+            <a:off x="0" y="0"/>
+            <a:ext cx="9144000" cy="6858000"/>
+          </a:xfrm>
+          <a:prstGeom prst="rect">
+            <a:avLst/>
+          </a:prstGeom>
+          <a:solidFill>
+            <a:schemeClr val="bg1"/>
+          </a:solidFill>
+        </p:spPr>
+        <p:style>
+          <a:lnRef idx="2">
+            <a:schemeClr val="accent1">
+              <a:shade val="50000"/>
+            </a:schemeClr>
+          </a:lnRef>
+          <a:fillRef idx="1">
+            <a:schemeClr val="accent1"/>
+          </a:fillRef>
+          <a:effectRef idx="0">
+            <a:schemeClr val="accent1"/>
+          </a:effectRef>
+          <a:fontRef idx="minor">
+            <a:schemeClr val="lt1"/>
+          </a:fontRef>
+        </p:style>
         <p:txBody>
-          <a:bodyPr/>
+          <a:bodyPr rtlCol="0" anchor="ctr"/>
           <a:lstStyle/>
           <a:p>
-            <a:r>
-              <a:rPr lang="pt-BR" dirty="0"/>
-              <a:t>Fundamentos e Aplicações</a:t>
-            </a:r>
-            <a:endParaRPr lang="en-US" dirty="0"/>
+            <a:pPr algn="ctr"/>
+            <a:endParaRPr lang="pt-BR"/>
           </a:p>
         </p:txBody>
       </p:sp>
+      <p:pic>
+        <p:nvPicPr>
+          <p:cNvPr id="3" name="Imagem 2">
+            <a:extLst>
+              <a:ext uri="{FF2B5EF4-FFF2-40B4-BE49-F238E27FC236}">
+                <a16:creationId xmlns:a16="http://schemas.microsoft.com/office/drawing/2014/main" id="{EEC783AE-4FD1-4E0C-AA49-F5ED224DD82B}"/>
+              </a:ext>
+            </a:extLst>
+          </p:cNvPr>
+          <p:cNvPicPr>
+            <a:picLocks noChangeAspect="1"/>
+          </p:cNvPicPr>
+          <p:nvPr/>
+        </p:nvPicPr>
+        <p:blipFill>
+          <a:blip r:embed="rId2"/>
+          <a:stretch>
+            <a:fillRect/>
+          </a:stretch>
+        </p:blipFill>
+        <p:spPr>
+          <a:xfrm>
+            <a:off x="56755" y="1755000"/>
+            <a:ext cx="9030490" cy="3348000"/>
+          </a:xfrm>
+          <a:prstGeom prst="rect">
+            <a:avLst/>
+          </a:prstGeom>
+        </p:spPr>
+      </p:pic>
     </p:spTree>
     <p:extLst>
       <p:ext uri="{BB962C8B-B14F-4D97-AF65-F5344CB8AC3E}">
-        <p14:creationId xmlns:p14="http://schemas.microsoft.com/office/powerpoint/2010/main" val="2024468889"/>
+        <p14:creationId xmlns:p14="http://schemas.microsoft.com/office/powerpoint/2010/main" val="1422129494"/>
       </p:ext>
     </p:extLst>
   </p:cSld>
@@ -25716,7 +25770,7 @@
           <p:cNvPr id="2" name="Título 1">
             <a:extLst>
               <a:ext uri="{FF2B5EF4-FFF2-40B4-BE49-F238E27FC236}">
-                <a16:creationId xmlns:a16="http://schemas.microsoft.com/office/drawing/2014/main" id="{C151024F-5738-491F-A26B-C42E25889B6B}"/>
+                <a16:creationId xmlns:a16="http://schemas.microsoft.com/office/drawing/2014/main" id="{80A3EDF8-6915-4E59-99C8-6E887ECA49E4}"/>
               </a:ext>
             </a:extLst>
           </p:cNvPr>
@@ -25736,8 +25790,96 @@
           <a:p>
             <a:r>
               <a:rPr lang="pt-BR" dirty="0"/>
-              <a:t>Condição de Reconstrução Perfeita</a:t>
-            </a:r>
+              <a:t>Decomposição Multiaxial / Multivariável</a:t>
+            </a:r>
+          </a:p>
+        </p:txBody>
+      </p:sp>
+      <p:sp>
+        <p:nvSpPr>
+          <p:cNvPr id="4" name="Espaço Reservado para Texto 3">
+            <a:extLst>
+              <a:ext uri="{FF2B5EF4-FFF2-40B4-BE49-F238E27FC236}">
+                <a16:creationId xmlns:a16="http://schemas.microsoft.com/office/drawing/2014/main" id="{8ADE41B2-13AA-4430-8A2C-AE98AB3D3BA7}"/>
+              </a:ext>
+            </a:extLst>
+          </p:cNvPr>
+          <p:cNvSpPr>
+            <a:spLocks noGrp="1"/>
+          </p:cNvSpPr>
+          <p:nvPr>
+            <p:ph type="body" sz="quarter" idx="14"/>
+          </p:nvPr>
+        </p:nvSpPr>
+        <p:spPr>
+          <a:xfrm>
+            <a:off x="236054" y="954794"/>
+            <a:ext cx="6964255" cy="1794578"/>
+          </a:xfrm>
+        </p:spPr>
+        <p:txBody>
+          <a:bodyPr>
+            <a:normAutofit lnSpcReduction="10000"/>
+          </a:bodyPr>
+          <a:lstStyle/>
+          <a:p>
+            <a:r>
+              <a:rPr lang="pt-BR" b="1" dirty="0"/>
+              <a:t>Decomposição Multiaxial (ou Multinível):</a:t>
+            </a:r>
+            <a:endParaRPr lang="pt-BR" dirty="0"/>
+          </a:p>
+          <a:p>
+            <a:pPr>
+              <a:buFont typeface="Arial" panose="020B0604020202020204" pitchFamily="34" charset="0"/>
+              <a:buChar char="•"/>
+            </a:pPr>
+            <a:r>
+              <a:rPr lang="pt-BR" dirty="0"/>
+              <a:t>Processo iterativo de aplicar o banco de filtros </a:t>
+            </a:r>
+            <a:r>
+              <a:rPr lang="pt-BR" b="1" dirty="0"/>
+              <a:t>em cada </a:t>
+            </a:r>
+            <a:r>
+              <a:rPr lang="pt-BR" b="1" dirty="0" err="1"/>
+              <a:t>subbanda</a:t>
+            </a:r>
+            <a:r>
+              <a:rPr lang="pt-BR" dirty="0"/>
+              <a:t>.</a:t>
+            </a:r>
+          </a:p>
+          <a:p>
+            <a:pPr>
+              <a:buFont typeface="Arial" panose="020B0604020202020204" pitchFamily="34" charset="0"/>
+              <a:buChar char="•"/>
+            </a:pPr>
+            <a:r>
+              <a:rPr lang="pt-BR" dirty="0"/>
+              <a:t>Permite representar o sinal em </a:t>
+            </a:r>
+            <a:r>
+              <a:rPr lang="pt-BR" b="1" dirty="0"/>
+              <a:t>múltiplas resoluções</a:t>
+            </a:r>
+            <a:r>
+              <a:rPr lang="pt-BR" dirty="0"/>
+              <a:t> (frequências).</a:t>
+            </a:r>
+          </a:p>
+          <a:p>
+            <a:endParaRPr lang="pt-BR" dirty="0"/>
+          </a:p>
+          <a:p>
+            <a:r>
+              <a:rPr lang="pt-BR" dirty="0"/>
+              <a:t>Exemplo (nível 2):</a:t>
+            </a:r>
+          </a:p>
+          <a:p>
+            <a:endParaRPr lang="pt-BR" dirty="0"/>
           </a:p>
         </p:txBody>
       </p:sp>
@@ -25746,7 +25888,7 @@
           <p:cNvPr id="5" name="Espaço Reservado para Número de Slide 4">
             <a:extLst>
               <a:ext uri="{FF2B5EF4-FFF2-40B4-BE49-F238E27FC236}">
-                <a16:creationId xmlns:a16="http://schemas.microsoft.com/office/drawing/2014/main" id="{6151B15E-402F-47B2-ACF7-289AF58B7168}"/>
+                <a16:creationId xmlns:a16="http://schemas.microsoft.com/office/drawing/2014/main" id="{244BEEBB-75D9-4D8D-879B-CF65AA7027A2}"/>
               </a:ext>
             </a:extLst>
           </p:cNvPr>
@@ -25770,8 +25912,1214 @@
           </a:p>
         </p:txBody>
       </p:sp>
-      <mc:AlternateContent xmlns:mc="http://schemas.openxmlformats.org/markup-compatibility/2006">
-        <mc:Choice xmlns:a14="http://schemas.microsoft.com/office/drawing/2010/main" Requires="a14">
+      <p:pic>
+        <p:nvPicPr>
+          <p:cNvPr id="8" name="Espaço Reservado para Conteúdo 7">
+            <a:extLst>
+              <a:ext uri="{FF2B5EF4-FFF2-40B4-BE49-F238E27FC236}">
+                <a16:creationId xmlns:a16="http://schemas.microsoft.com/office/drawing/2014/main" id="{45B71935-0AD4-4370-B67B-834F4C4AE7FF}"/>
+              </a:ext>
+            </a:extLst>
+          </p:cNvPr>
+          <p:cNvPicPr>
+            <a:picLocks noGrp="1" noChangeAspect="1"/>
+          </p:cNvPicPr>
+          <p:nvPr>
+            <p:ph sz="quarter" idx="17"/>
+          </p:nvPr>
+        </p:nvPicPr>
+        <p:blipFill>
+          <a:blip r:embed="rId2"/>
+          <a:stretch>
+            <a:fillRect/>
+          </a:stretch>
+        </p:blipFill>
+        <p:spPr>
+          <a:xfrm>
+            <a:off x="889393" y="2820492"/>
+            <a:ext cx="7365213" cy="2559657"/>
+          </a:xfrm>
+        </p:spPr>
+      </p:pic>
+    </p:spTree>
+    <p:extLst>
+      <p:ext uri="{BB962C8B-B14F-4D97-AF65-F5344CB8AC3E}">
+        <p14:creationId xmlns:p14="http://schemas.microsoft.com/office/powerpoint/2010/main" val="1104506783"/>
+      </p:ext>
+    </p:extLst>
+  </p:cSld>
+  <p:clrMapOvr>
+    <a:masterClrMapping/>
+  </p:clrMapOvr>
+</p:sld>
+</file>
+
+<file path=ppt/slides/slide11.xml><?xml version="1.0" encoding="utf-8"?>
+<p:sld xmlns:a="http://schemas.openxmlformats.org/drawingml/2006/main" xmlns:r="http://schemas.openxmlformats.org/officeDocument/2006/relationships" xmlns:p="http://schemas.openxmlformats.org/presentationml/2006/main">
+  <p:cSld>
+    <p:spTree>
+      <p:nvGrpSpPr>
+        <p:cNvPr id="1" name=""/>
+        <p:cNvGrpSpPr/>
+        <p:nvPr/>
+      </p:nvGrpSpPr>
+      <p:grpSpPr>
+        <a:xfrm>
+          <a:off x="0" y="0"/>
+          <a:ext cx="0" cy="0"/>
+          <a:chOff x="0" y="0"/>
+          <a:chExt cx="0" cy="0"/>
+        </a:xfrm>
+      </p:grpSpPr>
+      <p:sp>
+        <p:nvSpPr>
+          <p:cNvPr id="9" name="Espaço Reservado para Texto 8">
+            <a:extLst>
+              <a:ext uri="{FF2B5EF4-FFF2-40B4-BE49-F238E27FC236}">
+                <a16:creationId xmlns:a16="http://schemas.microsoft.com/office/drawing/2014/main" id="{D7251D9B-1C7D-4247-ACE7-368F07122B3D}"/>
+              </a:ext>
+            </a:extLst>
+          </p:cNvPr>
+          <p:cNvSpPr>
+            <a:spLocks noGrp="1"/>
+          </p:cNvSpPr>
+          <p:nvPr>
+            <p:ph type="body" sz="quarter" idx="14"/>
+          </p:nvPr>
+        </p:nvSpPr>
+        <p:spPr>
+          <a:xfrm>
+            <a:off x="946785" y="1398735"/>
+            <a:ext cx="7250430" cy="3553427"/>
+          </a:xfrm>
+        </p:spPr>
+        <p:txBody>
+          <a:bodyPr/>
+          <a:lstStyle/>
+          <a:p>
+            <a:r>
+              <a:rPr lang="pt-BR" b="1" dirty="0"/>
+              <a:t>Decomposição Multivariável:</a:t>
+            </a:r>
+            <a:endParaRPr lang="pt-BR" dirty="0"/>
+          </a:p>
+          <a:p>
+            <a:pPr>
+              <a:buFont typeface="Arial" panose="020B0604020202020204" pitchFamily="34" charset="0"/>
+              <a:buChar char="•"/>
+            </a:pPr>
+            <a:r>
+              <a:rPr lang="pt-BR" dirty="0"/>
+              <a:t>Extensão para sinais com mais de uma dimensão (ex.: imagens 2D).</a:t>
+            </a:r>
+          </a:p>
+          <a:p>
+            <a:pPr>
+              <a:buFont typeface="Arial" panose="020B0604020202020204" pitchFamily="34" charset="0"/>
+              <a:buChar char="•"/>
+            </a:pPr>
+            <a:r>
+              <a:rPr lang="pt-BR" dirty="0"/>
+              <a:t>Aplica os filtros QMF nas </a:t>
+            </a:r>
+            <a:r>
+              <a:rPr lang="pt-BR" b="1" dirty="0"/>
+              <a:t>linhas e colunas</a:t>
+            </a:r>
+            <a:r>
+              <a:rPr lang="pt-BR" dirty="0"/>
+              <a:t> separadamente.</a:t>
+            </a:r>
+          </a:p>
+          <a:p>
+            <a:pPr>
+              <a:buFont typeface="Arial" panose="020B0604020202020204" pitchFamily="34" charset="0"/>
+              <a:buChar char="•"/>
+            </a:pPr>
+            <a:r>
+              <a:rPr lang="pt-BR" dirty="0"/>
+              <a:t>Forma as </a:t>
+            </a:r>
+            <a:r>
+              <a:rPr lang="pt-BR" dirty="0" err="1"/>
+              <a:t>sub-bandas</a:t>
+            </a:r>
+            <a:r>
+              <a:rPr lang="pt-BR" dirty="0"/>
+              <a:t>:</a:t>
+            </a:r>
+          </a:p>
+          <a:p>
+            <a:pPr marL="742950" lvl="1" indent="-285750">
+              <a:buFont typeface="Arial" panose="020B0604020202020204" pitchFamily="34" charset="0"/>
+              <a:buChar char="•"/>
+            </a:pPr>
+            <a:r>
+              <a:rPr lang="pt-BR" dirty="0"/>
+              <a:t>LL (</a:t>
+            </a:r>
+            <a:r>
+              <a:rPr lang="pt-BR" dirty="0" err="1"/>
+              <a:t>baixa-baixa</a:t>
+            </a:r>
+            <a:r>
+              <a:rPr lang="pt-BR" dirty="0"/>
+              <a:t>)</a:t>
+            </a:r>
+          </a:p>
+          <a:p>
+            <a:pPr marL="742950" lvl="1" indent="-285750">
+              <a:buFont typeface="Arial" panose="020B0604020202020204" pitchFamily="34" charset="0"/>
+              <a:buChar char="•"/>
+            </a:pPr>
+            <a:r>
+              <a:rPr lang="pt-BR" dirty="0"/>
+              <a:t>LH (</a:t>
+            </a:r>
+            <a:r>
+              <a:rPr lang="pt-BR" dirty="0" err="1"/>
+              <a:t>baixa-alta</a:t>
+            </a:r>
+            <a:r>
+              <a:rPr lang="pt-BR" dirty="0"/>
+              <a:t>)</a:t>
+            </a:r>
+          </a:p>
+          <a:p>
+            <a:pPr marL="742950" lvl="1" indent="-285750">
+              <a:buFont typeface="Arial" panose="020B0604020202020204" pitchFamily="34" charset="0"/>
+              <a:buChar char="•"/>
+            </a:pPr>
+            <a:r>
+              <a:rPr lang="pt-BR" dirty="0"/>
+              <a:t>HL (alta-baixa)</a:t>
+            </a:r>
+          </a:p>
+          <a:p>
+            <a:pPr marL="742950" lvl="1" indent="-285750">
+              <a:buFont typeface="Arial" panose="020B0604020202020204" pitchFamily="34" charset="0"/>
+              <a:buChar char="•"/>
+            </a:pPr>
+            <a:r>
+              <a:rPr lang="pt-BR" dirty="0"/>
+              <a:t>HH (alta-alta)</a:t>
+            </a:r>
+          </a:p>
+          <a:p>
+            <a:pPr>
+              <a:buFont typeface="Arial" panose="020B0604020202020204" pitchFamily="34" charset="0"/>
+              <a:buChar char="•"/>
+            </a:pPr>
+            <a:r>
+              <a:rPr lang="pt-BR" b="1" dirty="0"/>
+              <a:t>Usada em compressão de imagem (JPEG2000, por exemplo).</a:t>
+            </a:r>
+            <a:endParaRPr lang="pt-BR" dirty="0"/>
+          </a:p>
+          <a:p>
+            <a:endParaRPr lang="pt-BR" dirty="0"/>
+          </a:p>
+        </p:txBody>
+      </p:sp>
+      <p:sp>
+        <p:nvSpPr>
+          <p:cNvPr id="5" name="Espaço Reservado para Número de Slide 4">
+            <a:extLst>
+              <a:ext uri="{FF2B5EF4-FFF2-40B4-BE49-F238E27FC236}">
+                <a16:creationId xmlns:a16="http://schemas.microsoft.com/office/drawing/2014/main" id="{135C28DA-D785-4CEB-ABE5-DDFE31BA5BEB}"/>
+              </a:ext>
+            </a:extLst>
+          </p:cNvPr>
+          <p:cNvSpPr>
+            <a:spLocks noGrp="1"/>
+          </p:cNvSpPr>
+          <p:nvPr>
+            <p:ph type="sldNum" sz="quarter" idx="15"/>
+          </p:nvPr>
+        </p:nvSpPr>
+        <p:spPr/>
+        <p:txBody>
+          <a:bodyPr/>
+          <a:lstStyle/>
+          <a:p>
+            <a:fld id="{A16978B4-287B-0541-9C5D-483DA783F6CF}" type="slidenum">
+              <a:rPr lang="en-US" smtClean="0"/>
+              <a:t>11</a:t>
+            </a:fld>
+            <a:endParaRPr lang="en-US" dirty="0"/>
+          </a:p>
+        </p:txBody>
+      </p:sp>
+    </p:spTree>
+    <p:extLst>
+      <p:ext uri="{BB962C8B-B14F-4D97-AF65-F5344CB8AC3E}">
+        <p14:creationId xmlns:p14="http://schemas.microsoft.com/office/powerpoint/2010/main" val="2217385567"/>
+      </p:ext>
+    </p:extLst>
+  </p:cSld>
+  <p:clrMapOvr>
+    <a:masterClrMapping/>
+  </p:clrMapOvr>
+</p:sld>
+</file>
+
+<file path=ppt/slides/slide12.xml><?xml version="1.0" encoding="utf-8"?>
+<p:sld xmlns:a="http://schemas.openxmlformats.org/drawingml/2006/main" xmlns:r="http://schemas.openxmlformats.org/officeDocument/2006/relationships" xmlns:p="http://schemas.openxmlformats.org/presentationml/2006/main">
+  <p:cSld>
+    <p:spTree>
+      <p:nvGrpSpPr>
+        <p:cNvPr id="1" name=""/>
+        <p:cNvGrpSpPr/>
+        <p:nvPr/>
+      </p:nvGrpSpPr>
+      <p:grpSpPr>
+        <a:xfrm>
+          <a:off x="0" y="0"/>
+          <a:ext cx="0" cy="0"/>
+          <a:chOff x="0" y="0"/>
+          <a:chExt cx="0" cy="0"/>
+        </a:xfrm>
+      </p:grpSpPr>
+      <p:sp>
+        <p:nvSpPr>
+          <p:cNvPr id="2" name="Título 1">
+            <a:extLst>
+              <a:ext uri="{FF2B5EF4-FFF2-40B4-BE49-F238E27FC236}">
+                <a16:creationId xmlns:a16="http://schemas.microsoft.com/office/drawing/2014/main" id="{C35CB187-3982-4369-A10C-102D588E64A6}"/>
+              </a:ext>
+            </a:extLst>
+          </p:cNvPr>
+          <p:cNvSpPr>
+            <a:spLocks noGrp="1"/>
+          </p:cNvSpPr>
+          <p:nvPr>
+            <p:ph type="title"/>
+          </p:nvPr>
+        </p:nvSpPr>
+        <p:spPr/>
+        <p:txBody>
+          <a:bodyPr>
+            <a:normAutofit fontScale="90000"/>
+          </a:bodyPr>
+          <a:lstStyle/>
+          <a:p>
+            <a:r>
+              <a:rPr lang="pt-BR" dirty="0"/>
+              <a:t>Porque não deu certo?</a:t>
+            </a:r>
+          </a:p>
+        </p:txBody>
+      </p:sp>
+      <mc:AlternateContent xmlns:mc="http://schemas.openxmlformats.org/markup-compatibility/2006" xmlns:a14="http://schemas.microsoft.com/office/drawing/2010/main">
+        <mc:Choice Requires="a14">
+          <p:sp>
+            <p:nvSpPr>
+              <p:cNvPr id="3" name="Espaço Reservado para Texto 2">
+                <a:extLst>
+                  <a:ext uri="{FF2B5EF4-FFF2-40B4-BE49-F238E27FC236}">
+                    <a16:creationId xmlns:a16="http://schemas.microsoft.com/office/drawing/2014/main" id="{65CC17D8-6154-4E85-927B-5D4D58C85EF1}"/>
+                  </a:ext>
+                </a:extLst>
+              </p:cNvPr>
+              <p:cNvSpPr>
+                <a:spLocks noGrp="1"/>
+              </p:cNvSpPr>
+              <p:nvPr>
+                <p:ph type="body" sz="quarter" idx="13"/>
+              </p:nvPr>
+            </p:nvSpPr>
+            <p:spPr/>
+            <p:txBody>
+              <a:bodyPr>
+                <a:normAutofit fontScale="85000" lnSpcReduction="20000"/>
+              </a:bodyPr>
+              <a:lstStyle/>
+              <a:p>
+                <a:r>
+                  <a:rPr lang="pt-BR" dirty="0"/>
+                  <a:t>Compensar o atraso (</a:t>
+                </a:r>
+                <a14:m>
+                  <m:oMath xmlns:m="http://schemas.openxmlformats.org/officeDocument/2006/math">
+                    <m:sSup>
+                      <m:sSupPr>
+                        <m:ctrlPr>
+                          <a:rPr lang="pt-BR" i="1" smtClean="0">
+                            <a:latin typeface="Cambria Math" panose="02040503050406030204" pitchFamily="18" charset="0"/>
+                          </a:rPr>
+                        </m:ctrlPr>
+                      </m:sSupPr>
+                      <m:e>
+                        <m:r>
+                          <a:rPr lang="pt-BR" b="0" i="1" smtClean="0">
+                            <a:latin typeface="Cambria Math" panose="02040503050406030204" pitchFamily="18" charset="0"/>
+                          </a:rPr>
+                          <m:t>𝑍</m:t>
+                        </m:r>
+                      </m:e>
+                      <m:sup>
+                        <m:r>
+                          <a:rPr lang="pt-BR" b="0" i="1" smtClean="0">
+                            <a:latin typeface="Cambria Math" panose="02040503050406030204" pitchFamily="18" charset="0"/>
+                          </a:rPr>
+                          <m:t>−</m:t>
+                        </m:r>
+                        <m:r>
+                          <a:rPr lang="pt-BR" b="0" i="1" smtClean="0">
+                            <a:latin typeface="Cambria Math" panose="02040503050406030204" pitchFamily="18" charset="0"/>
+                          </a:rPr>
+                          <m:t>𝑘</m:t>
+                        </m:r>
+                      </m:sup>
+                    </m:sSup>
+                  </m:oMath>
+                </a14:m>
+                <a:r>
+                  <a:rPr lang="pt-BR" dirty="0"/>
+                  <a:t>): </a:t>
+                </a:r>
+              </a:p>
+            </p:txBody>
+          </p:sp>
+        </mc:Choice>
+        <mc:Fallback xmlns="">
+          <p:sp>
+            <p:nvSpPr>
+              <p:cNvPr id="3" name="Espaço Reservado para Texto 2">
+                <a:extLst>
+                  <a:ext uri="{FF2B5EF4-FFF2-40B4-BE49-F238E27FC236}">
+                    <a16:creationId xmlns:a16="http://schemas.microsoft.com/office/drawing/2014/main" id="{65CC17D8-6154-4E85-927B-5D4D58C85EF1}"/>
+                  </a:ext>
+                </a:extLst>
+              </p:cNvPr>
+              <p:cNvSpPr>
+                <a:spLocks noGrp="1" noRot="1" noChangeAspect="1" noMove="1" noResize="1" noEditPoints="1" noAdjustHandles="1" noChangeArrowheads="1" noChangeShapeType="1" noTextEdit="1"/>
+              </p:cNvSpPr>
+              <p:nvPr>
+                <p:ph type="body" sz="quarter" idx="13"/>
+              </p:nvPr>
+            </p:nvSpPr>
+            <p:spPr>
+              <a:blipFill>
+                <a:blip r:embed="rId2"/>
+                <a:stretch>
+                  <a:fillRect l="-840" t="-31481" b="-31481"/>
+                </a:stretch>
+              </a:blipFill>
+            </p:spPr>
+            <p:txBody>
+              <a:bodyPr/>
+              <a:lstStyle/>
+              <a:p>
+                <a:r>
+                  <a:rPr lang="pt-BR">
+                    <a:noFill/>
+                  </a:rPr>
+                  <a:t> </a:t>
+                </a:r>
+              </a:p>
+            </p:txBody>
+          </p:sp>
+        </mc:Fallback>
+      </mc:AlternateContent>
+      <p:sp>
+        <p:nvSpPr>
+          <p:cNvPr id="4" name="Espaço Reservado para Texto 3">
+            <a:extLst>
+              <a:ext uri="{FF2B5EF4-FFF2-40B4-BE49-F238E27FC236}">
+                <a16:creationId xmlns:a16="http://schemas.microsoft.com/office/drawing/2014/main" id="{A1E51E9A-F205-460A-AD26-A41DA8B3C5BF}"/>
+              </a:ext>
+            </a:extLst>
+          </p:cNvPr>
+          <p:cNvSpPr>
+            <a:spLocks noGrp="1"/>
+          </p:cNvSpPr>
+          <p:nvPr>
+            <p:ph type="body" sz="quarter" idx="14"/>
+          </p:nvPr>
+        </p:nvSpPr>
+        <p:spPr/>
+        <p:txBody>
+          <a:bodyPr/>
+          <a:lstStyle/>
+          <a:p>
+            <a:endParaRPr lang="pt-BR" dirty="0"/>
+          </a:p>
+        </p:txBody>
+      </p:sp>
+      <p:sp>
+        <p:nvSpPr>
+          <p:cNvPr id="5" name="Espaço Reservado para Número de Slide 4">
+            <a:extLst>
+              <a:ext uri="{FF2B5EF4-FFF2-40B4-BE49-F238E27FC236}">
+                <a16:creationId xmlns:a16="http://schemas.microsoft.com/office/drawing/2014/main" id="{A6D99C4B-6E7B-43A5-8420-54E323F7C79B}"/>
+              </a:ext>
+            </a:extLst>
+          </p:cNvPr>
+          <p:cNvSpPr>
+            <a:spLocks noGrp="1"/>
+          </p:cNvSpPr>
+          <p:nvPr>
+            <p:ph type="sldNum" sz="quarter" idx="15"/>
+          </p:nvPr>
+        </p:nvSpPr>
+        <p:spPr/>
+        <p:txBody>
+          <a:bodyPr/>
+          <a:lstStyle/>
+          <a:p>
+            <a:fld id="{A16978B4-287B-0541-9C5D-483DA783F6CF}" type="slidenum">
+              <a:rPr lang="en-US" smtClean="0"/>
+              <a:t>12</a:t>
+            </a:fld>
+            <a:endParaRPr lang="en-US" dirty="0"/>
+          </a:p>
+        </p:txBody>
+      </p:sp>
+      <p:pic>
+        <p:nvPicPr>
+          <p:cNvPr id="7" name="Imagem 6">
+            <a:extLst>
+              <a:ext uri="{FF2B5EF4-FFF2-40B4-BE49-F238E27FC236}">
+                <a16:creationId xmlns:a16="http://schemas.microsoft.com/office/drawing/2014/main" id="{84716439-3A7C-41BB-BCAE-A56BA1FC6CEE}"/>
+              </a:ext>
+            </a:extLst>
+          </p:cNvPr>
+          <p:cNvPicPr>
+            <a:picLocks noChangeAspect="1"/>
+          </p:cNvPicPr>
+          <p:nvPr/>
+        </p:nvPicPr>
+        <p:blipFill>
+          <a:blip r:embed="rId3"/>
+          <a:stretch>
+            <a:fillRect/>
+          </a:stretch>
+        </p:blipFill>
+        <p:spPr>
+          <a:xfrm>
+            <a:off x="119592" y="1400200"/>
+            <a:ext cx="8904816" cy="4057599"/>
+          </a:xfrm>
+          <a:prstGeom prst="rect">
+            <a:avLst/>
+          </a:prstGeom>
+        </p:spPr>
+      </p:pic>
+    </p:spTree>
+    <p:extLst>
+      <p:ext uri="{BB962C8B-B14F-4D97-AF65-F5344CB8AC3E}">
+        <p14:creationId xmlns:p14="http://schemas.microsoft.com/office/powerpoint/2010/main" val="716550864"/>
+      </p:ext>
+    </p:extLst>
+  </p:cSld>
+  <p:clrMapOvr>
+    <a:masterClrMapping/>
+  </p:clrMapOvr>
+</p:sld>
+</file>
+
+<file path=ppt/slides/slide13.xml><?xml version="1.0" encoding="utf-8"?>
+<p:sld xmlns:a="http://schemas.openxmlformats.org/drawingml/2006/main" xmlns:r="http://schemas.openxmlformats.org/officeDocument/2006/relationships" xmlns:p="http://schemas.openxmlformats.org/presentationml/2006/main">
+  <p:cSld>
+    <p:spTree>
+      <p:nvGrpSpPr>
+        <p:cNvPr id="1" name=""/>
+        <p:cNvGrpSpPr/>
+        <p:nvPr/>
+      </p:nvGrpSpPr>
+      <p:grpSpPr>
+        <a:xfrm>
+          <a:off x="0" y="0"/>
+          <a:ext cx="0" cy="0"/>
+          <a:chOff x="0" y="0"/>
+          <a:chExt cx="0" cy="0"/>
+        </a:xfrm>
+      </p:grpSpPr>
+      <p:sp>
+        <p:nvSpPr>
+          <p:cNvPr id="2" name="Título 1">
+            <a:extLst>
+              <a:ext uri="{FF2B5EF4-FFF2-40B4-BE49-F238E27FC236}">
+                <a16:creationId xmlns:a16="http://schemas.microsoft.com/office/drawing/2014/main" id="{4C0225C4-B001-496B-9359-402CBC161880}"/>
+              </a:ext>
+            </a:extLst>
+          </p:cNvPr>
+          <p:cNvSpPr>
+            <a:spLocks noGrp="1"/>
+          </p:cNvSpPr>
+          <p:nvPr>
+            <p:ph type="title"/>
+          </p:nvPr>
+        </p:nvSpPr>
+        <p:spPr/>
+        <p:txBody>
+          <a:bodyPr>
+            <a:normAutofit fontScale="90000"/>
+          </a:bodyPr>
+          <a:lstStyle/>
+          <a:p>
+            <a:r>
+              <a:rPr lang="pt-BR" dirty="0"/>
+              <a:t>Bloco de Atraso</a:t>
+            </a:r>
+          </a:p>
+        </p:txBody>
+      </p:sp>
+      <p:sp>
+        <p:nvSpPr>
+          <p:cNvPr id="5" name="Espaço Reservado para Número de Slide 4">
+            <a:extLst>
+              <a:ext uri="{FF2B5EF4-FFF2-40B4-BE49-F238E27FC236}">
+                <a16:creationId xmlns:a16="http://schemas.microsoft.com/office/drawing/2014/main" id="{5D6FE3A7-D322-4C61-8A80-7D7F6BAF4980}"/>
+              </a:ext>
+            </a:extLst>
+          </p:cNvPr>
+          <p:cNvSpPr>
+            <a:spLocks noGrp="1"/>
+          </p:cNvSpPr>
+          <p:nvPr>
+            <p:ph type="sldNum" sz="quarter" idx="15"/>
+          </p:nvPr>
+        </p:nvSpPr>
+        <p:spPr/>
+        <p:txBody>
+          <a:bodyPr/>
+          <a:lstStyle/>
+          <a:p>
+            <a:fld id="{A16978B4-287B-0541-9C5D-483DA783F6CF}" type="slidenum">
+              <a:rPr lang="en-US" smtClean="0"/>
+              <a:t>13</a:t>
+            </a:fld>
+            <a:endParaRPr lang="en-US" dirty="0"/>
+          </a:p>
+        </p:txBody>
+      </p:sp>
+      <p:sp>
+        <p:nvSpPr>
+          <p:cNvPr id="7" name="Rectangle 2">
+            <a:extLst>
+              <a:ext uri="{FF2B5EF4-FFF2-40B4-BE49-F238E27FC236}">
+                <a16:creationId xmlns:a16="http://schemas.microsoft.com/office/drawing/2014/main" id="{C244C7D5-1E6A-4F2A-B3AB-DB2CCB5F8278}"/>
+              </a:ext>
+            </a:extLst>
+          </p:cNvPr>
+          <p:cNvSpPr>
+            <a:spLocks noGrp="1" noChangeArrowheads="1"/>
+          </p:cNvSpPr>
+          <p:nvPr>
+            <p:ph type="body" sz="quarter" idx="14"/>
+          </p:nvPr>
+        </p:nvSpPr>
+        <p:spPr bwMode="auto">
+          <a:xfrm>
+            <a:off x="239184" y="1700970"/>
+            <a:ext cx="8831264" cy="3416320"/>
+          </a:xfrm>
+          <a:prstGeom prst="rect">
+            <a:avLst/>
+          </a:prstGeom>
+          <a:noFill/>
+          <a:ln>
+            <a:noFill/>
+          </a:ln>
+          <a:effectLst/>
+          <a:extLst>
+            <a:ext uri="{909E8E84-426E-40DD-AFC4-6F175D3DCCD1}">
+              <a14:hiddenFill xmlns:a14="http://schemas.microsoft.com/office/drawing/2010/main">
+                <a:solidFill>
+                  <a:schemeClr val="accent1"/>
+                </a:solidFill>
+              </a14:hiddenFill>
+            </a:ext>
+            <a:ext uri="{91240B29-F687-4F45-9708-019B960494DF}">
+              <a14:hiddenLine xmlns:a14="http://schemas.microsoft.com/office/drawing/2010/main" w="9525">
+                <a:solidFill>
+                  <a:schemeClr val="tx1"/>
+                </a:solidFill>
+                <a:miter lim="800000"/>
+                <a:headEnd/>
+                <a:tailEnd/>
+              </a14:hiddenLine>
+            </a:ext>
+            <a:ext uri="{AF507438-7753-43E0-B8FC-AC1667EBCBE1}">
+              <a14:hiddenEffects xmlns:a14="http://schemas.microsoft.com/office/drawing/2010/main">
+                <a:effectLst>
+                  <a:outerShdw dist="35921" dir="2700000" algn="ctr" rotWithShape="0">
+                    <a:schemeClr val="bg2"/>
+                  </a:outerShdw>
+                </a:effectLst>
+              </a14:hiddenEffects>
+            </a:ext>
+          </a:extLst>
+        </p:spPr>
+        <p:txBody>
+          <a:bodyPr vert="horz" wrap="none" lIns="91440" tIns="45720" rIns="91440" bIns="45720" numCol="1" anchor="ctr" anchorCtr="0" compatLnSpc="1">
+            <a:prstTxWarp prst="textNoShape">
+              <a:avLst/>
+            </a:prstTxWarp>
+            <a:spAutoFit/>
+          </a:bodyPr>
+          <a:lstStyle/>
+          <a:p>
+            <a:pPr marL="0" marR="0" lvl="0" indent="0" algn="l" defTabSz="914400" rtl="0" eaLnBrk="0" fontAlgn="base" latinLnBrk="0" hangingPunct="0">
+              <a:lnSpc>
+                <a:spcPct val="100000"/>
+              </a:lnSpc>
+              <a:spcBef>
+                <a:spcPct val="0"/>
+              </a:spcBef>
+              <a:spcAft>
+                <a:spcPct val="0"/>
+              </a:spcAft>
+              <a:buClrTx/>
+              <a:buSzTx/>
+              <a:buFontTx/>
+              <a:buChar char="•"/>
+              <a:tabLst/>
+            </a:pPr>
+            <a:r>
+              <a:rPr kumimoji="0" lang="pt-BR" altLang="pt-BR" sz="1800" b="1" i="0" u="none" strike="noStrike" cap="none" normalizeH="0" baseline="0" dirty="0">
+                <a:ln>
+                  <a:noFill/>
+                </a:ln>
+                <a:solidFill>
+                  <a:schemeClr val="tx1"/>
+                </a:solidFill>
+                <a:effectLst/>
+                <a:latin typeface="Arial" panose="020B0604020202020204" pitchFamily="34" charset="0"/>
+              </a:rPr>
+              <a:t>Símbolo:</a:t>
+            </a:r>
+            <a:r>
+              <a:rPr kumimoji="0" lang="pt-BR" altLang="pt-BR" sz="1800" b="0" i="0" u="none" strike="noStrike" cap="none" normalizeH="0" baseline="0" dirty="0">
+                <a:ln>
+                  <a:noFill/>
+                </a:ln>
+                <a:solidFill>
+                  <a:schemeClr val="tx1"/>
+                </a:solidFill>
+                <a:effectLst/>
+                <a:latin typeface="Arial" panose="020B0604020202020204" pitchFamily="34" charset="0"/>
+              </a:rPr>
+              <a:t> z⁻ᵏ</a:t>
+            </a:r>
+          </a:p>
+          <a:p>
+            <a:pPr marL="0" marR="0" lvl="0" indent="0" algn="l" defTabSz="914400" rtl="0" eaLnBrk="0" fontAlgn="base" latinLnBrk="0" hangingPunct="0">
+              <a:lnSpc>
+                <a:spcPct val="100000"/>
+              </a:lnSpc>
+              <a:spcBef>
+                <a:spcPct val="0"/>
+              </a:spcBef>
+              <a:spcAft>
+                <a:spcPct val="0"/>
+              </a:spcAft>
+              <a:buClrTx/>
+              <a:buSzTx/>
+              <a:tabLst/>
+            </a:pPr>
+            <a:endParaRPr kumimoji="0" lang="pt-BR" altLang="pt-BR" sz="1800" b="0" i="0" u="none" strike="noStrike" cap="none" normalizeH="0" baseline="0" dirty="0">
+              <a:ln>
+                <a:noFill/>
+              </a:ln>
+              <a:solidFill>
+                <a:schemeClr val="tx1"/>
+              </a:solidFill>
+              <a:effectLst/>
+              <a:latin typeface="Arial" panose="020B0604020202020204" pitchFamily="34" charset="0"/>
+            </a:endParaRPr>
+          </a:p>
+          <a:p>
+            <a:pPr marL="0" marR="0" lvl="0" indent="0" algn="l" defTabSz="914400" rtl="0" eaLnBrk="0" fontAlgn="base" latinLnBrk="0" hangingPunct="0">
+              <a:lnSpc>
+                <a:spcPct val="100000"/>
+              </a:lnSpc>
+              <a:spcBef>
+                <a:spcPct val="0"/>
+              </a:spcBef>
+              <a:spcAft>
+                <a:spcPct val="0"/>
+              </a:spcAft>
+              <a:buClrTx/>
+              <a:buSzTx/>
+              <a:buFontTx/>
+              <a:buChar char="•"/>
+              <a:tabLst/>
+            </a:pPr>
+            <a:r>
+              <a:rPr kumimoji="0" lang="pt-BR" altLang="pt-BR" sz="1800" b="1" i="0" u="none" strike="noStrike" cap="none" normalizeH="0" baseline="0" dirty="0">
+                <a:ln>
+                  <a:noFill/>
+                </a:ln>
+                <a:solidFill>
+                  <a:schemeClr val="tx1"/>
+                </a:solidFill>
+                <a:effectLst/>
+                <a:latin typeface="Arial" panose="020B0604020202020204" pitchFamily="34" charset="0"/>
+              </a:rPr>
+              <a:t>Função:</a:t>
+            </a:r>
+            <a:br>
+              <a:rPr kumimoji="0" lang="pt-BR" altLang="pt-BR" sz="1800" b="0" i="0" u="none" strike="noStrike" cap="none" normalizeH="0" baseline="0" dirty="0">
+                <a:ln>
+                  <a:noFill/>
+                </a:ln>
+                <a:solidFill>
+                  <a:schemeClr val="tx1"/>
+                </a:solidFill>
+                <a:effectLst/>
+                <a:latin typeface="Arial" panose="020B0604020202020204" pitchFamily="34" charset="0"/>
+              </a:rPr>
+            </a:br>
+            <a:r>
+              <a:rPr kumimoji="0" lang="pt-BR" altLang="pt-BR" sz="1800" b="0" i="0" u="none" strike="noStrike" cap="none" normalizeH="0" baseline="0" dirty="0">
+                <a:ln>
+                  <a:noFill/>
+                </a:ln>
+                <a:solidFill>
+                  <a:schemeClr val="tx1"/>
+                </a:solidFill>
+                <a:effectLst/>
+                <a:latin typeface="Arial" panose="020B0604020202020204" pitchFamily="34" charset="0"/>
+              </a:rPr>
+              <a:t>Introduz um </a:t>
+            </a:r>
+            <a:r>
+              <a:rPr kumimoji="0" lang="pt-BR" altLang="pt-BR" sz="1800" b="1" i="0" u="none" strike="noStrike" cap="none" normalizeH="0" baseline="0" dirty="0">
+                <a:ln>
+                  <a:noFill/>
+                </a:ln>
+                <a:solidFill>
+                  <a:schemeClr val="tx1"/>
+                </a:solidFill>
+                <a:effectLst/>
+                <a:latin typeface="Arial" panose="020B0604020202020204" pitchFamily="34" charset="0"/>
+              </a:rPr>
+              <a:t>deslocamento temporal controlado</a:t>
+            </a:r>
+            <a:r>
+              <a:rPr kumimoji="0" lang="pt-BR" altLang="pt-BR" sz="1800" b="0" i="0" u="none" strike="noStrike" cap="none" normalizeH="0" baseline="0" dirty="0">
+                <a:ln>
+                  <a:noFill/>
+                </a:ln>
+                <a:solidFill>
+                  <a:schemeClr val="tx1"/>
+                </a:solidFill>
+                <a:effectLst/>
+                <a:latin typeface="Arial" panose="020B0604020202020204" pitchFamily="34" charset="0"/>
+              </a:rPr>
+              <a:t> no sinal.</a:t>
+            </a:r>
+          </a:p>
+          <a:p>
+            <a:pPr marL="0" marR="0" lvl="0" indent="0" algn="l" defTabSz="914400" rtl="0" eaLnBrk="0" fontAlgn="base" latinLnBrk="0" hangingPunct="0">
+              <a:lnSpc>
+                <a:spcPct val="100000"/>
+              </a:lnSpc>
+              <a:spcBef>
+                <a:spcPct val="0"/>
+              </a:spcBef>
+              <a:spcAft>
+                <a:spcPct val="0"/>
+              </a:spcAft>
+              <a:buClrTx/>
+              <a:buSzTx/>
+              <a:tabLst/>
+            </a:pPr>
+            <a:endParaRPr kumimoji="0" lang="pt-BR" altLang="pt-BR" sz="1800" b="0" i="0" u="none" strike="noStrike" cap="none" normalizeH="0" baseline="0" dirty="0">
+              <a:ln>
+                <a:noFill/>
+              </a:ln>
+              <a:solidFill>
+                <a:schemeClr val="tx1"/>
+              </a:solidFill>
+              <a:effectLst/>
+              <a:latin typeface="Arial" panose="020B0604020202020204" pitchFamily="34" charset="0"/>
+            </a:endParaRPr>
+          </a:p>
+          <a:p>
+            <a:pPr marL="0" marR="0" lvl="0" indent="0" algn="l" defTabSz="914400" rtl="0" eaLnBrk="0" fontAlgn="base" latinLnBrk="0" hangingPunct="0">
+              <a:lnSpc>
+                <a:spcPct val="100000"/>
+              </a:lnSpc>
+              <a:spcBef>
+                <a:spcPct val="0"/>
+              </a:spcBef>
+              <a:spcAft>
+                <a:spcPct val="0"/>
+              </a:spcAft>
+              <a:buClrTx/>
+              <a:buSzTx/>
+              <a:buFontTx/>
+              <a:buChar char="•"/>
+              <a:tabLst/>
+            </a:pPr>
+            <a:r>
+              <a:rPr kumimoji="0" lang="pt-BR" altLang="pt-BR" sz="1800" b="1" i="0" u="none" strike="noStrike" cap="none" normalizeH="0" baseline="0" dirty="0">
+                <a:ln>
+                  <a:noFill/>
+                </a:ln>
+                <a:solidFill>
+                  <a:schemeClr val="tx1"/>
+                </a:solidFill>
+                <a:effectLst/>
+                <a:latin typeface="Arial" panose="020B0604020202020204" pitchFamily="34" charset="0"/>
+              </a:rPr>
+              <a:t>Importância no QMF:</a:t>
+            </a:r>
+            <a:endParaRPr kumimoji="0" lang="pt-BR" altLang="pt-BR" sz="1800" b="0" i="0" u="none" strike="noStrike" cap="none" normalizeH="0" baseline="0" dirty="0">
+              <a:ln>
+                <a:noFill/>
+              </a:ln>
+              <a:solidFill>
+                <a:schemeClr val="tx1"/>
+              </a:solidFill>
+              <a:effectLst/>
+              <a:latin typeface="Arial" panose="020B0604020202020204" pitchFamily="34" charset="0"/>
+            </a:endParaRPr>
+          </a:p>
+          <a:p>
+            <a:pPr lvl="1" defTabSz="914400" eaLnBrk="0" fontAlgn="base" hangingPunct="0">
+              <a:lnSpc>
+                <a:spcPct val="100000"/>
+              </a:lnSpc>
+              <a:spcBef>
+                <a:spcPct val="0"/>
+              </a:spcBef>
+              <a:spcAft>
+                <a:spcPct val="0"/>
+              </a:spcAft>
+              <a:buFontTx/>
+              <a:buChar char="•"/>
+            </a:pPr>
+            <a:r>
+              <a:rPr kumimoji="0" lang="pt-BR" altLang="pt-BR" b="0" i="0" u="none" strike="noStrike" cap="none" normalizeH="0" baseline="0" dirty="0">
+                <a:ln>
+                  <a:noFill/>
+                </a:ln>
+                <a:solidFill>
+                  <a:schemeClr val="tx1"/>
+                </a:solidFill>
+                <a:effectLst/>
+                <a:latin typeface="Arial" panose="020B0604020202020204" pitchFamily="34" charset="0"/>
+              </a:rPr>
+              <a:t> Compensar </a:t>
+            </a:r>
+            <a:r>
+              <a:rPr kumimoji="0" lang="pt-BR" altLang="pt-BR" b="1" i="0" u="none" strike="noStrike" cap="none" normalizeH="0" baseline="0" dirty="0">
+                <a:ln>
+                  <a:noFill/>
+                </a:ln>
+                <a:solidFill>
+                  <a:schemeClr val="tx1"/>
+                </a:solidFill>
+                <a:effectLst/>
+                <a:latin typeface="Arial" panose="020B0604020202020204" pitchFamily="34" charset="0"/>
+              </a:rPr>
+              <a:t>diferenças de fase</a:t>
+            </a:r>
+            <a:r>
+              <a:rPr kumimoji="0" lang="pt-BR" altLang="pt-BR" b="0" i="0" u="none" strike="noStrike" cap="none" normalizeH="0" baseline="0" dirty="0">
+                <a:ln>
+                  <a:noFill/>
+                </a:ln>
+                <a:solidFill>
+                  <a:schemeClr val="tx1"/>
+                </a:solidFill>
+                <a:effectLst/>
+                <a:latin typeface="Arial" panose="020B0604020202020204" pitchFamily="34" charset="0"/>
+              </a:rPr>
+              <a:t> entre </a:t>
+            </a:r>
+            <a:r>
+              <a:rPr kumimoji="0" lang="pt-BR" altLang="pt-BR" b="0" i="0" u="none" strike="noStrike" cap="none" normalizeH="0" baseline="0" dirty="0" err="1">
+                <a:ln>
+                  <a:noFill/>
+                </a:ln>
+                <a:solidFill>
+                  <a:schemeClr val="tx1"/>
+                </a:solidFill>
+                <a:effectLst/>
+                <a:latin typeface="Arial" panose="020B0604020202020204" pitchFamily="34" charset="0"/>
+              </a:rPr>
+              <a:t>sub-bandas</a:t>
+            </a:r>
+            <a:r>
+              <a:rPr kumimoji="0" lang="pt-BR" altLang="pt-BR" b="0" i="0" u="none" strike="noStrike" cap="none" normalizeH="0" baseline="0" dirty="0">
+                <a:ln>
+                  <a:noFill/>
+                </a:ln>
+                <a:solidFill>
+                  <a:schemeClr val="tx1"/>
+                </a:solidFill>
+                <a:effectLst/>
+                <a:latin typeface="Arial" panose="020B0604020202020204" pitchFamily="34" charset="0"/>
+              </a:rPr>
+              <a:t>.</a:t>
+            </a:r>
+          </a:p>
+          <a:p>
+            <a:pPr lvl="1" defTabSz="914400" eaLnBrk="0" fontAlgn="base" hangingPunct="0">
+              <a:lnSpc>
+                <a:spcPct val="100000"/>
+              </a:lnSpc>
+              <a:spcBef>
+                <a:spcPct val="0"/>
+              </a:spcBef>
+              <a:spcAft>
+                <a:spcPct val="0"/>
+              </a:spcAft>
+              <a:buFontTx/>
+              <a:buChar char="•"/>
+            </a:pPr>
+            <a:r>
+              <a:rPr kumimoji="0" lang="pt-BR" altLang="pt-BR" b="0" i="0" u="none" strike="noStrike" cap="none" normalizeH="0" baseline="0" dirty="0">
+                <a:ln>
+                  <a:noFill/>
+                </a:ln>
+                <a:solidFill>
+                  <a:schemeClr val="tx1"/>
+                </a:solidFill>
+                <a:effectLst/>
+                <a:latin typeface="Arial" panose="020B0604020202020204" pitchFamily="34" charset="0"/>
+              </a:rPr>
+              <a:t> Garantir </a:t>
+            </a:r>
+            <a:r>
+              <a:rPr kumimoji="0" lang="pt-BR" altLang="pt-BR" b="1" i="0" u="none" strike="noStrike" cap="none" normalizeH="0" baseline="0" dirty="0">
+                <a:ln>
+                  <a:noFill/>
+                </a:ln>
+                <a:solidFill>
+                  <a:schemeClr val="tx1"/>
+                </a:solidFill>
+                <a:effectLst/>
+                <a:latin typeface="Arial" panose="020B0604020202020204" pitchFamily="34" charset="0"/>
+              </a:rPr>
+              <a:t>alinhamento temporal</a:t>
+            </a:r>
+            <a:r>
+              <a:rPr kumimoji="0" lang="pt-BR" altLang="pt-BR" b="0" i="0" u="none" strike="noStrike" cap="none" normalizeH="0" baseline="0" dirty="0">
+                <a:ln>
+                  <a:noFill/>
+                </a:ln>
+                <a:solidFill>
+                  <a:schemeClr val="tx1"/>
+                </a:solidFill>
+                <a:effectLst/>
+                <a:latin typeface="Arial" panose="020B0604020202020204" pitchFamily="34" charset="0"/>
+              </a:rPr>
+              <a:t> entre as componentes na recomposição.</a:t>
+            </a:r>
+          </a:p>
+          <a:p>
+            <a:pPr marL="0" marR="0" lvl="0" indent="0" algn="l" defTabSz="914400" rtl="0" eaLnBrk="0" fontAlgn="base" latinLnBrk="0" hangingPunct="0">
+              <a:lnSpc>
+                <a:spcPct val="100000"/>
+              </a:lnSpc>
+              <a:spcBef>
+                <a:spcPct val="0"/>
+              </a:spcBef>
+              <a:spcAft>
+                <a:spcPct val="0"/>
+              </a:spcAft>
+              <a:buClrTx/>
+              <a:buSzTx/>
+              <a:buFontTx/>
+              <a:buChar char="•"/>
+              <a:tabLst/>
+            </a:pPr>
+            <a:endParaRPr kumimoji="0" lang="pt-BR" altLang="pt-BR" sz="1800" b="1" i="0" u="none" strike="noStrike" cap="none" normalizeH="0" baseline="0" dirty="0">
+              <a:ln>
+                <a:noFill/>
+              </a:ln>
+              <a:solidFill>
+                <a:schemeClr val="tx1"/>
+              </a:solidFill>
+              <a:effectLst/>
+              <a:latin typeface="Arial" panose="020B0604020202020204" pitchFamily="34" charset="0"/>
+            </a:endParaRPr>
+          </a:p>
+          <a:p>
+            <a:pPr marL="0" marR="0" lvl="0" indent="0" algn="l" defTabSz="914400" rtl="0" eaLnBrk="0" fontAlgn="base" latinLnBrk="0" hangingPunct="0">
+              <a:lnSpc>
+                <a:spcPct val="100000"/>
+              </a:lnSpc>
+              <a:spcBef>
+                <a:spcPct val="0"/>
+              </a:spcBef>
+              <a:spcAft>
+                <a:spcPct val="0"/>
+              </a:spcAft>
+              <a:buClrTx/>
+              <a:buSzTx/>
+              <a:buFontTx/>
+              <a:buChar char="•"/>
+              <a:tabLst/>
+            </a:pPr>
+            <a:r>
+              <a:rPr kumimoji="0" lang="pt-BR" altLang="pt-BR" sz="1800" b="1" i="0" u="none" strike="noStrike" cap="none" normalizeH="0" baseline="0" dirty="0">
+                <a:ln>
+                  <a:noFill/>
+                </a:ln>
+                <a:solidFill>
+                  <a:schemeClr val="tx1"/>
+                </a:solidFill>
+                <a:effectLst/>
+                <a:latin typeface="Arial" panose="020B0604020202020204" pitchFamily="34" charset="0"/>
+              </a:rPr>
+              <a:t>Exemplo prático:</a:t>
+            </a:r>
+            <a:br>
+              <a:rPr kumimoji="0" lang="pt-BR" altLang="pt-BR" sz="1800" b="0" i="0" u="none" strike="noStrike" cap="none" normalizeH="0" baseline="0" dirty="0">
+                <a:ln>
+                  <a:noFill/>
+                </a:ln>
+                <a:solidFill>
+                  <a:schemeClr val="tx1"/>
+                </a:solidFill>
+                <a:effectLst/>
+                <a:latin typeface="Arial" panose="020B0604020202020204" pitchFamily="34" charset="0"/>
+              </a:rPr>
+            </a:br>
+            <a:r>
+              <a:rPr kumimoji="0" lang="pt-BR" altLang="pt-BR" sz="1800" b="0" i="0" u="none" strike="noStrike" cap="none" normalizeH="0" baseline="0" dirty="0">
+                <a:ln>
+                  <a:noFill/>
+                </a:ln>
+                <a:solidFill>
+                  <a:schemeClr val="tx1"/>
+                </a:solidFill>
+                <a:effectLst/>
+                <a:latin typeface="Arial" panose="020B0604020202020204" pitchFamily="34" charset="0"/>
+              </a:rPr>
+              <a:t>Se H₀(z) e H₁(z) introduzem atrasos diferentes, um bloco z⁻ᵏ ajusta a defasagem na </a:t>
+            </a:r>
+          </a:p>
+          <a:p>
+            <a:pPr marL="0" marR="0" lvl="0" indent="0" algn="l" defTabSz="914400" rtl="0" eaLnBrk="0" fontAlgn="base" latinLnBrk="0" hangingPunct="0">
+              <a:lnSpc>
+                <a:spcPct val="100000"/>
+              </a:lnSpc>
+              <a:spcBef>
+                <a:spcPct val="0"/>
+              </a:spcBef>
+              <a:spcAft>
+                <a:spcPct val="0"/>
+              </a:spcAft>
+              <a:buClrTx/>
+              <a:buSzTx/>
+              <a:tabLst/>
+            </a:pPr>
+            <a:r>
+              <a:rPr kumimoji="0" lang="pt-BR" altLang="pt-BR" sz="1800" b="0" i="0" u="none" strike="noStrike" cap="none" normalizeH="0" baseline="0" dirty="0">
+                <a:ln>
+                  <a:noFill/>
+                </a:ln>
+                <a:solidFill>
+                  <a:schemeClr val="tx1"/>
+                </a:solidFill>
+                <a:effectLst/>
+                <a:latin typeface="Arial" panose="020B0604020202020204" pitchFamily="34" charset="0"/>
+              </a:rPr>
+              <a:t>etapa de síntese.</a:t>
+            </a:r>
+          </a:p>
+        </p:txBody>
+      </p:sp>
+    </p:spTree>
+    <p:extLst>
+      <p:ext uri="{BB962C8B-B14F-4D97-AF65-F5344CB8AC3E}">
+        <p14:creationId xmlns:p14="http://schemas.microsoft.com/office/powerpoint/2010/main" val="2049782236"/>
+      </p:ext>
+    </p:extLst>
+  </p:cSld>
+  <p:clrMapOvr>
+    <a:masterClrMapping/>
+  </p:clrMapOvr>
+</p:sld>
+</file>
+
+<file path=ppt/slides/slide14.xml><?xml version="1.0" encoding="utf-8"?>
+<p:sld xmlns:a="http://schemas.openxmlformats.org/drawingml/2006/main" xmlns:r="http://schemas.openxmlformats.org/officeDocument/2006/relationships" xmlns:p="http://schemas.openxmlformats.org/presentationml/2006/main">
+  <p:cSld>
+    <p:spTree>
+      <p:nvGrpSpPr>
+        <p:cNvPr id="1" name=""/>
+        <p:cNvGrpSpPr/>
+        <p:nvPr/>
+      </p:nvGrpSpPr>
+      <p:grpSpPr>
+        <a:xfrm>
+          <a:off x="0" y="0"/>
+          <a:ext cx="0" cy="0"/>
+          <a:chOff x="0" y="0"/>
+          <a:chExt cx="0" cy="0"/>
+        </a:xfrm>
+      </p:grpSpPr>
+      <p:sp>
+        <p:nvSpPr>
+          <p:cNvPr id="2" name="Título 1">
+            <a:extLst>
+              <a:ext uri="{FF2B5EF4-FFF2-40B4-BE49-F238E27FC236}">
+                <a16:creationId xmlns:a16="http://schemas.microsoft.com/office/drawing/2014/main" id="{C151024F-5738-491F-A26B-C42E25889B6B}"/>
+              </a:ext>
+            </a:extLst>
+          </p:cNvPr>
+          <p:cNvSpPr>
+            <a:spLocks noGrp="1"/>
+          </p:cNvSpPr>
+          <p:nvPr>
+            <p:ph type="title"/>
+          </p:nvPr>
+        </p:nvSpPr>
+        <p:spPr/>
+        <p:txBody>
+          <a:bodyPr>
+            <a:normAutofit fontScale="90000"/>
+          </a:bodyPr>
+          <a:lstStyle/>
+          <a:p>
+            <a:r>
+              <a:rPr lang="pt-BR" dirty="0"/>
+              <a:t>Condição de Reconstrução Perfeita</a:t>
+            </a:r>
+          </a:p>
+        </p:txBody>
+      </p:sp>
+      <p:sp>
+        <p:nvSpPr>
+          <p:cNvPr id="5" name="Espaço Reservado para Número de Slide 4">
+            <a:extLst>
+              <a:ext uri="{FF2B5EF4-FFF2-40B4-BE49-F238E27FC236}">
+                <a16:creationId xmlns:a16="http://schemas.microsoft.com/office/drawing/2014/main" id="{6151B15E-402F-47B2-ACF7-289AF58B7168}"/>
+              </a:ext>
+            </a:extLst>
+          </p:cNvPr>
+          <p:cNvSpPr>
+            <a:spLocks noGrp="1"/>
+          </p:cNvSpPr>
+          <p:nvPr>
+            <p:ph type="sldNum" sz="quarter" idx="15"/>
+          </p:nvPr>
+        </p:nvSpPr>
+        <p:spPr/>
+        <p:txBody>
+          <a:bodyPr/>
+          <a:lstStyle/>
+          <a:p>
+            <a:fld id="{A16978B4-287B-0541-9C5D-483DA783F6CF}" type="slidenum">
+              <a:rPr lang="en-US" smtClean="0"/>
+              <a:t>14</a:t>
+            </a:fld>
+            <a:endParaRPr lang="en-US" dirty="0"/>
+          </a:p>
+        </p:txBody>
+      </p:sp>
+      <mc:AlternateContent xmlns:mc="http://schemas.openxmlformats.org/markup-compatibility/2006" xmlns:a14="http://schemas.microsoft.com/office/drawing/2010/main">
+        <mc:Choice Requires="a14">
           <p:sp>
             <p:nvSpPr>
               <p:cNvPr id="6" name="Rectangle 1">
@@ -25974,7 +27322,7 @@
                             <a:rPr lang="pt-BR" altLang="pt-BR" b="0" i="1" smtClean="0">
                               <a:latin typeface="Cambria Math" panose="02040503050406030204" pitchFamily="18" charset="0"/>
                             </a:rPr>
-                            <m:t>𝐹</m:t>
+                            <m:t>𝐺</m:t>
                           </m:r>
                         </m:e>
                         <m:sub>
@@ -26061,10 +27409,10 @@
                         </m:sSubPr>
                         <m:e>
                           <m:r>
-                            <a:rPr lang="pt-BR" altLang="pt-BR" i="1">
+                            <a:rPr lang="pt-BR" altLang="pt-BR" b="0" i="1" smtClean="0">
                               <a:latin typeface="Cambria Math" panose="02040503050406030204" pitchFamily="18" charset="0"/>
                             </a:rPr>
-                            <m:t>𝐹</m:t>
+                            <m:t>𝐺</m:t>
                           </m:r>
                         </m:e>
                         <m:sub>
@@ -26304,7 +27652,7 @@
                             <a:rPr lang="pt-BR" altLang="pt-BR" b="0" i="1" smtClean="0">
                               <a:latin typeface="Cambria Math" panose="02040503050406030204" pitchFamily="18" charset="0"/>
                             </a:rPr>
-                            <m:t>𝐹</m:t>
+                            <m:t>𝐺</m:t>
                           </m:r>
                         </m:e>
                         <m:sub>
@@ -26397,10 +27745,10 @@
                         </m:sSubPr>
                         <m:e>
                           <m:r>
-                            <a:rPr lang="pt-BR" altLang="pt-BR" i="1">
+                            <a:rPr lang="pt-BR" altLang="pt-BR" b="0" i="1" smtClean="0">
                               <a:latin typeface="Cambria Math" panose="02040503050406030204" pitchFamily="18" charset="0"/>
                             </a:rPr>
-                            <m:t>𝐹</m:t>
+                            <m:t>𝐺</m:t>
                           </m:r>
                         </m:e>
                         <m:sub>
@@ -26433,13 +27781,7 @@
                         <a:rPr lang="pt-BR" altLang="pt-BR" b="0" i="1" smtClean="0">
                           <a:latin typeface="Cambria Math" panose="02040503050406030204" pitchFamily="18" charset="0"/>
                         </a:rPr>
-                        <m:t>=</m:t>
-                      </m:r>
-                      <m:r>
-                        <a:rPr lang="pt-BR" altLang="pt-BR" b="0" i="1" smtClean="0">
-                          <a:latin typeface="Cambria Math" panose="02040503050406030204" pitchFamily="18" charset="0"/>
-                        </a:rPr>
-                        <m:t>0</m:t>
+                        <m:t>=0</m:t>
                       </m:r>
                     </m:oMath>
                   </m:oMathPara>
@@ -26573,7 +27915,7 @@
                     <a:effectLst/>
                     <a:latin typeface="Arial" panose="020B0604020202020204" pitchFamily="34" charset="0"/>
                   </a:rPr>
-                  <a:t> F₀, F₁ → filtros de síntese</a:t>
+                  <a:t> G₀, G₁ → filtros de síntese</a:t>
                 </a:r>
               </a:p>
               <a:p>
@@ -26786,7 +28128,7 @@
             </p:txBody>
           </p:sp>
         </mc:Choice>
-        <mc:Fallback>
+        <mc:Fallback xmlns="">
           <p:sp>
             <p:nvSpPr>
               <p:cNvPr id="6" name="Rectangle 1">
@@ -26878,7 +28220,7 @@
 </p:sld>
 </file>
 
-<file path=ppt/slides/slide11.xml><?xml version="1.0" encoding="utf-8"?>
+<file path=ppt/slides/slide15.xml><?xml version="1.0" encoding="utf-8"?>
 <p:sld xmlns:a="http://schemas.openxmlformats.org/drawingml/2006/main" xmlns:r="http://schemas.openxmlformats.org/officeDocument/2006/relationships" xmlns:p="http://schemas.openxmlformats.org/presentationml/2006/main">
   <p:cSld>
     <p:spTree>
@@ -27180,7 +28522,7 @@
           <a:p>
             <a:fld id="{A16978B4-287B-0541-9C5D-483DA783F6CF}" type="slidenum">
               <a:rPr lang="en-US" smtClean="0"/>
-              <a:t>11</a:t>
+              <a:t>15</a:t>
             </a:fld>
             <a:endParaRPr lang="en-US" dirty="0"/>
           </a:p>
@@ -27199,7 +28541,7 @@
 </p:sld>
 </file>
 
-<file path=ppt/slides/slide12.xml><?xml version="1.0" encoding="utf-8"?>
+<file path=ppt/slides/slide16.xml><?xml version="1.0" encoding="utf-8"?>
 <p:sld xmlns:a="http://schemas.openxmlformats.org/drawingml/2006/main" xmlns:r="http://schemas.openxmlformats.org/officeDocument/2006/relationships" xmlns:p="http://schemas.openxmlformats.org/presentationml/2006/main">
   <p:cSld>
     <p:spTree>
@@ -27241,7 +28583,7 @@
           <a:p>
             <a:r>
               <a:rPr lang="pt-BR" dirty="0"/>
-              <a:t>Exemplo:</a:t>
+              <a:t>Exemplos:</a:t>
             </a:r>
           </a:p>
         </p:txBody>
@@ -27290,7 +28632,7 @@
 </p:sld>
 </file>
 
-<file path=ppt/slides/slide13.xml><?xml version="1.0" encoding="utf-8"?>
+<file path=ppt/slides/slide17.xml><?xml version="1.0" encoding="utf-8"?>
 <p:sld xmlns:a="http://schemas.openxmlformats.org/drawingml/2006/main" xmlns:r="http://schemas.openxmlformats.org/officeDocument/2006/relationships" xmlns:p="http://schemas.openxmlformats.org/presentationml/2006/main">
   <p:cSld>
     <p:spTree>
@@ -27519,7 +28861,7 @@
           <a:p>
             <a:fld id="{A16978B4-287B-0541-9C5D-483DA783F6CF}" type="slidenum">
               <a:rPr lang="en-US" smtClean="0"/>
-              <a:t>13</a:t>
+              <a:t>17</a:t>
             </a:fld>
             <a:endParaRPr lang="en-US" dirty="0"/>
           </a:p>
@@ -27538,7 +28880,7 @@
 </p:sld>
 </file>
 
-<file path=ppt/slides/slide14.xml><?xml version="1.0" encoding="utf-8"?>
+<file path=ppt/slides/slide18.xml><?xml version="1.0" encoding="utf-8"?>
 <p:sld xmlns:a="http://schemas.openxmlformats.org/drawingml/2006/main" xmlns:r="http://schemas.openxmlformats.org/officeDocument/2006/relationships" xmlns:p="http://schemas.openxmlformats.org/presentationml/2006/main">
   <p:cSld>
     <p:spTree>
@@ -27615,239 +28957,10 @@
       </p:grpSpPr>
       <p:sp>
         <p:nvSpPr>
-          <p:cNvPr id="2" name="Título 1">
-            <a:extLst>
-              <a:ext uri="{FF2B5EF4-FFF2-40B4-BE49-F238E27FC236}">
-                <a16:creationId xmlns:a16="http://schemas.microsoft.com/office/drawing/2014/main" id="{672B5389-17EC-4FBC-8141-9A8AF7EA2CCB}"/>
-              </a:ext>
-            </a:extLst>
-          </p:cNvPr>
-          <p:cNvSpPr>
-            <a:spLocks noGrp="1"/>
-          </p:cNvSpPr>
-          <p:nvPr>
-            <p:ph type="title"/>
-          </p:nvPr>
-        </p:nvSpPr>
-        <p:spPr/>
-        <p:txBody>
-          <a:bodyPr>
-            <a:normAutofit fontScale="90000"/>
-          </a:bodyPr>
-          <a:lstStyle/>
-          <a:p>
-            <a:r>
-              <a:rPr lang="pt-BR" dirty="0"/>
-              <a:t>Introdução aos Filtros QMF</a:t>
-            </a:r>
-          </a:p>
-        </p:txBody>
-      </p:sp>
-      <p:sp>
-        <p:nvSpPr>
-          <p:cNvPr id="4" name="Espaço Reservado para Texto 3">
-            <a:extLst>
-              <a:ext uri="{FF2B5EF4-FFF2-40B4-BE49-F238E27FC236}">
-                <a16:creationId xmlns:a16="http://schemas.microsoft.com/office/drawing/2014/main" id="{B9CEBB5F-C6FC-4455-9EA9-91976D23023E}"/>
-              </a:ext>
-            </a:extLst>
-          </p:cNvPr>
-          <p:cNvSpPr>
-            <a:spLocks noGrp="1"/>
-          </p:cNvSpPr>
-          <p:nvPr>
-            <p:ph type="body" sz="quarter" idx="14"/>
-          </p:nvPr>
-        </p:nvSpPr>
-        <p:spPr>
-          <a:xfrm>
-            <a:off x="239184" y="1043355"/>
-            <a:ext cx="7250430" cy="4583722"/>
-          </a:xfrm>
-        </p:spPr>
-        <p:txBody>
-          <a:bodyPr/>
-          <a:lstStyle/>
-          <a:p>
-            <a:pPr marL="285750" indent="-285750">
-              <a:buFont typeface="Arial" panose="020B0604020202020204" pitchFamily="34" charset="0"/>
-              <a:buChar char="•"/>
-            </a:pPr>
-            <a:r>
-              <a:rPr lang="pt-BR" b="1" dirty="0"/>
-              <a:t>Definição:</a:t>
-            </a:r>
-            <a:br>
-              <a:rPr lang="pt-BR" dirty="0"/>
-            </a:br>
-            <a:r>
-              <a:rPr lang="pt-BR" dirty="0"/>
-              <a:t>Filtros QMF (</a:t>
-            </a:r>
-            <a:r>
-              <a:rPr lang="pt-BR" i="1" dirty="0" err="1"/>
-              <a:t>Quadrature</a:t>
-            </a:r>
-            <a:r>
-              <a:rPr lang="pt-BR" i="1" dirty="0"/>
-              <a:t> </a:t>
-            </a:r>
-            <a:r>
-              <a:rPr lang="pt-BR" i="1" dirty="0" err="1"/>
-              <a:t>Mirror</a:t>
-            </a:r>
-            <a:r>
-              <a:rPr lang="pt-BR" i="1" dirty="0"/>
-              <a:t> </a:t>
-            </a:r>
-            <a:r>
-              <a:rPr lang="pt-BR" i="1" dirty="0" err="1"/>
-              <a:t>Filters</a:t>
-            </a:r>
-            <a:r>
-              <a:rPr lang="pt-BR" dirty="0"/>
-              <a:t>) são pares de filtros projetados para dividir um sinal em </a:t>
-            </a:r>
-            <a:r>
-              <a:rPr lang="pt-BR" b="1" dirty="0" err="1"/>
-              <a:t>sub-bandas</a:t>
-            </a:r>
-            <a:r>
-              <a:rPr lang="pt-BR" b="1" dirty="0"/>
-              <a:t> complementares</a:t>
-            </a:r>
-            <a:r>
-              <a:rPr lang="pt-BR" dirty="0"/>
-              <a:t> (tipicamente </a:t>
-            </a:r>
-            <a:r>
-              <a:rPr lang="pt-BR" dirty="0" err="1"/>
-              <a:t>passa-baixas</a:t>
-            </a:r>
-            <a:r>
-              <a:rPr lang="pt-BR" dirty="0"/>
-              <a:t> e </a:t>
-            </a:r>
-            <a:r>
-              <a:rPr lang="pt-BR" dirty="0" err="1"/>
-              <a:t>passa-altas</a:t>
-            </a:r>
-            <a:r>
-              <a:rPr lang="pt-BR" dirty="0"/>
-              <a:t>), mantendo a </a:t>
-            </a:r>
-            <a:r>
-              <a:rPr lang="pt-BR" b="1" dirty="0"/>
-              <a:t>reconstrução perfeita</a:t>
-            </a:r>
-            <a:r>
-              <a:rPr lang="pt-BR" dirty="0"/>
-              <a:t> do sinal original.</a:t>
-            </a:r>
-          </a:p>
-          <a:p>
-            <a:endParaRPr lang="pt-BR" dirty="0"/>
-          </a:p>
-          <a:p>
-            <a:pPr marL="285750" indent="-285750">
-              <a:buFont typeface="Arial" panose="020B0604020202020204" pitchFamily="34" charset="0"/>
-              <a:buChar char="•"/>
-            </a:pPr>
-            <a:r>
-              <a:rPr lang="pt-BR" dirty="0"/>
-              <a:t>Objetivo:</a:t>
-            </a:r>
-          </a:p>
-          <a:p>
-            <a:pPr marL="628625" lvl="1" indent="-285750">
-              <a:buFont typeface="Arial" panose="020B0604020202020204" pitchFamily="34" charset="0"/>
-              <a:buChar char="•"/>
-            </a:pPr>
-            <a:r>
-              <a:rPr lang="pt-BR" dirty="0"/>
-              <a:t>Separar o espectro de um sinal em bandas distintas.</a:t>
-            </a:r>
-          </a:p>
-          <a:p>
-            <a:pPr marL="628625" lvl="1" indent="-285750">
-              <a:buFont typeface="Arial" panose="020B0604020202020204" pitchFamily="34" charset="0"/>
-              <a:buChar char="•"/>
-            </a:pPr>
-            <a:r>
-              <a:rPr lang="pt-BR" dirty="0"/>
-              <a:t>Reduzir a redundância.</a:t>
-            </a:r>
-          </a:p>
-          <a:p>
-            <a:pPr marL="628625" lvl="1" indent="-285750">
-              <a:buFont typeface="Arial" panose="020B0604020202020204" pitchFamily="34" charset="0"/>
-              <a:buChar char="•"/>
-            </a:pPr>
-            <a:r>
-              <a:rPr lang="pt-BR" dirty="0"/>
-              <a:t>Facilitar a compressão ou análise de componentes espectrais.</a:t>
-            </a:r>
-          </a:p>
-          <a:p>
-            <a:pPr lvl="1"/>
-            <a:endParaRPr lang="pt-BR" dirty="0"/>
-          </a:p>
-          <a:p>
-            <a:pPr marL="285750" indent="-285750">
-              <a:buFont typeface="Arial" panose="020B0604020202020204" pitchFamily="34" charset="0"/>
-              <a:buChar char="•"/>
-            </a:pPr>
-            <a:r>
-              <a:rPr lang="pt-BR" dirty="0"/>
-              <a:t>Objetivo:</a:t>
-            </a:r>
-            <a:br>
-              <a:rPr lang="pt-BR" dirty="0"/>
-            </a:br>
-            <a:r>
-              <a:rPr lang="pt-BR" dirty="0"/>
-              <a:t>Desenvolvidos para aplicações em </a:t>
-            </a:r>
-            <a:r>
-              <a:rPr lang="pt-BR" b="1" dirty="0"/>
-              <a:t>bancos de filtros</a:t>
-            </a:r>
-            <a:r>
-              <a:rPr lang="pt-BR" dirty="0"/>
-              <a:t> e </a:t>
-            </a:r>
-            <a:r>
-              <a:rPr lang="pt-BR" b="1" dirty="0"/>
-              <a:t>análise </a:t>
-            </a:r>
-            <a:r>
-              <a:rPr lang="pt-BR" b="1" dirty="0" err="1"/>
-              <a:t>multirresolução</a:t>
-            </a:r>
-            <a:r>
-              <a:rPr lang="pt-BR" dirty="0"/>
-              <a:t> (como a transformada </a:t>
-            </a:r>
-            <a:r>
-              <a:rPr lang="pt-BR" dirty="0" err="1"/>
-              <a:t>wavelet</a:t>
-            </a:r>
-            <a:r>
-              <a:rPr lang="pt-BR" dirty="0"/>
-              <a:t>).</a:t>
-            </a:r>
-          </a:p>
-          <a:p>
-            <a:endParaRPr lang="pt-BR" dirty="0"/>
-          </a:p>
-        </p:txBody>
-      </p:sp>
-      <p:sp>
-        <p:nvSpPr>
           <p:cNvPr id="5" name="Espaço Reservado para Número de Slide 4">
             <a:extLst>
               <a:ext uri="{FF2B5EF4-FFF2-40B4-BE49-F238E27FC236}">
-                <a16:creationId xmlns:a16="http://schemas.microsoft.com/office/drawing/2014/main" id="{237C6F17-B3D3-48CF-A3D6-B1370E41D814}"/>
+                <a16:creationId xmlns:a16="http://schemas.microsoft.com/office/drawing/2014/main" id="{C3B69EF7-525D-4265-811F-BF28535E79F0}"/>
               </a:ext>
             </a:extLst>
           </p:cNvPr>
@@ -27871,10 +28984,86 @@
           </a:p>
         </p:txBody>
       </p:sp>
+      <p:sp>
+        <p:nvSpPr>
+          <p:cNvPr id="9" name="Retângulo 8">
+            <a:extLst>
+              <a:ext uri="{FF2B5EF4-FFF2-40B4-BE49-F238E27FC236}">
+                <a16:creationId xmlns:a16="http://schemas.microsoft.com/office/drawing/2014/main" id="{E965D651-33E1-4EAC-8F86-E8FCBDA52C33}"/>
+              </a:ext>
+            </a:extLst>
+          </p:cNvPr>
+          <p:cNvSpPr/>
+          <p:nvPr/>
+        </p:nvSpPr>
+        <p:spPr>
+          <a:xfrm>
+            <a:off x="0" y="0"/>
+            <a:ext cx="9144000" cy="6858000"/>
+          </a:xfrm>
+          <a:prstGeom prst="rect">
+            <a:avLst/>
+          </a:prstGeom>
+        </p:spPr>
+        <p:style>
+          <a:lnRef idx="2">
+            <a:schemeClr val="accent1">
+              <a:shade val="50000"/>
+            </a:schemeClr>
+          </a:lnRef>
+          <a:fillRef idx="1">
+            <a:schemeClr val="accent1"/>
+          </a:fillRef>
+          <a:effectRef idx="0">
+            <a:schemeClr val="accent1"/>
+          </a:effectRef>
+          <a:fontRef idx="minor">
+            <a:schemeClr val="lt1"/>
+          </a:fontRef>
+        </p:style>
+        <p:txBody>
+          <a:bodyPr rtlCol="0" anchor="ctr"/>
+          <a:lstStyle/>
+          <a:p>
+            <a:pPr algn="ctr"/>
+            <a:endParaRPr lang="pt-BR"/>
+          </a:p>
+        </p:txBody>
+      </p:sp>
+      <p:pic>
+        <p:nvPicPr>
+          <p:cNvPr id="10" name="Imagem 9">
+            <a:extLst>
+              <a:ext uri="{FF2B5EF4-FFF2-40B4-BE49-F238E27FC236}">
+                <a16:creationId xmlns:a16="http://schemas.microsoft.com/office/drawing/2014/main" id="{B64D2C7A-1C07-475E-B62E-60B49AB95815}"/>
+              </a:ext>
+            </a:extLst>
+          </p:cNvPr>
+          <p:cNvPicPr>
+            <a:picLocks noChangeAspect="1"/>
+          </p:cNvPicPr>
+          <p:nvPr/>
+        </p:nvPicPr>
+        <p:blipFill>
+          <a:blip r:embed="rId2"/>
+          <a:stretch>
+            <a:fillRect/>
+          </a:stretch>
+        </p:blipFill>
+        <p:spPr>
+          <a:xfrm>
+            <a:off x="121708" y="91281"/>
+            <a:ext cx="8900584" cy="6675438"/>
+          </a:xfrm>
+          <a:prstGeom prst="rect">
+            <a:avLst/>
+          </a:prstGeom>
+        </p:spPr>
+      </p:pic>
     </p:spTree>
     <p:extLst>
       <p:ext uri="{BB962C8B-B14F-4D97-AF65-F5344CB8AC3E}">
-        <p14:creationId xmlns:p14="http://schemas.microsoft.com/office/powerpoint/2010/main" val="79631331"/>
+        <p14:creationId xmlns:p14="http://schemas.microsoft.com/office/powerpoint/2010/main" val="801324430"/>
       </p:ext>
     </p:extLst>
   </p:cSld>
@@ -27903,6 +29092,560 @@
       </p:grpSpPr>
       <p:sp>
         <p:nvSpPr>
+          <p:cNvPr id="2" name="Title 1">
+            <a:extLst>
+              <a:ext uri="{FF2B5EF4-FFF2-40B4-BE49-F238E27FC236}">
+                <a16:creationId xmlns:a16="http://schemas.microsoft.com/office/drawing/2014/main" id="{02724BF9-0242-8747-BB26-263A6FCFEAB1}"/>
+              </a:ext>
+            </a:extLst>
+          </p:cNvPr>
+          <p:cNvSpPr>
+            <a:spLocks noGrp="1"/>
+          </p:cNvSpPr>
+          <p:nvPr>
+            <p:ph type="ctrTitle"/>
+          </p:nvPr>
+        </p:nvSpPr>
+        <p:spPr/>
+        <p:txBody>
+          <a:bodyPr/>
+          <a:lstStyle/>
+          <a:p>
+            <a:r>
+              <a:rPr lang="pt-BR" dirty="0"/>
+              <a:t>Filtros QMF</a:t>
+            </a:r>
+            <a:endParaRPr lang="en-US" dirty="0"/>
+          </a:p>
+        </p:txBody>
+      </p:sp>
+      <p:sp>
+        <p:nvSpPr>
+          <p:cNvPr id="3" name="Subtitle 2">
+            <a:extLst>
+              <a:ext uri="{FF2B5EF4-FFF2-40B4-BE49-F238E27FC236}">
+                <a16:creationId xmlns:a16="http://schemas.microsoft.com/office/drawing/2014/main" id="{F39E6E9E-180B-E04D-919D-31130DA62AAF}"/>
+              </a:ext>
+            </a:extLst>
+          </p:cNvPr>
+          <p:cNvSpPr>
+            <a:spLocks noGrp="1"/>
+          </p:cNvSpPr>
+          <p:nvPr>
+            <p:ph type="subTitle" idx="1"/>
+          </p:nvPr>
+        </p:nvSpPr>
+        <p:spPr/>
+        <p:txBody>
+          <a:bodyPr/>
+          <a:lstStyle/>
+          <a:p>
+            <a:r>
+              <a:rPr lang="pt-BR" dirty="0"/>
+              <a:t>Fundamentos e Aplicações</a:t>
+            </a:r>
+            <a:endParaRPr lang="en-US" dirty="0"/>
+          </a:p>
+        </p:txBody>
+      </p:sp>
+    </p:spTree>
+    <p:extLst>
+      <p:ext uri="{BB962C8B-B14F-4D97-AF65-F5344CB8AC3E}">
+        <p14:creationId xmlns:p14="http://schemas.microsoft.com/office/powerpoint/2010/main" val="2024468889"/>
+      </p:ext>
+    </p:extLst>
+  </p:cSld>
+  <p:clrMapOvr>
+    <a:masterClrMapping/>
+  </p:clrMapOvr>
+</p:sld>
+</file>
+
+<file path=ppt/slides/slide4.xml><?xml version="1.0" encoding="utf-8"?>
+<p:sld xmlns:a="http://schemas.openxmlformats.org/drawingml/2006/main" xmlns:r="http://schemas.openxmlformats.org/officeDocument/2006/relationships" xmlns:p="http://schemas.openxmlformats.org/presentationml/2006/main">
+  <p:cSld>
+    <p:spTree>
+      <p:nvGrpSpPr>
+        <p:cNvPr id="1" name=""/>
+        <p:cNvGrpSpPr/>
+        <p:nvPr/>
+      </p:nvGrpSpPr>
+      <p:grpSpPr>
+        <a:xfrm>
+          <a:off x="0" y="0"/>
+          <a:ext cx="0" cy="0"/>
+          <a:chOff x="0" y="0"/>
+          <a:chExt cx="0" cy="0"/>
+        </a:xfrm>
+      </p:grpSpPr>
+      <p:sp>
+        <p:nvSpPr>
+          <p:cNvPr id="5" name="Espaço Reservado para Número de Slide 4">
+            <a:extLst>
+              <a:ext uri="{FF2B5EF4-FFF2-40B4-BE49-F238E27FC236}">
+                <a16:creationId xmlns:a16="http://schemas.microsoft.com/office/drawing/2014/main" id="{C0D6E959-2109-4601-BD46-B573935DFFE9}"/>
+              </a:ext>
+            </a:extLst>
+          </p:cNvPr>
+          <p:cNvSpPr>
+            <a:spLocks noGrp="1"/>
+          </p:cNvSpPr>
+          <p:nvPr>
+            <p:ph type="sldNum" sz="quarter" idx="15"/>
+          </p:nvPr>
+        </p:nvSpPr>
+        <p:spPr/>
+        <p:txBody>
+          <a:bodyPr/>
+          <a:lstStyle/>
+          <a:p>
+            <a:fld id="{A16978B4-287B-0541-9C5D-483DA783F6CF}" type="slidenum">
+              <a:rPr lang="en-US" smtClean="0"/>
+              <a:t>4</a:t>
+            </a:fld>
+            <a:endParaRPr lang="en-US" dirty="0"/>
+          </a:p>
+        </p:txBody>
+      </p:sp>
+      <p:pic>
+        <p:nvPicPr>
+          <p:cNvPr id="3" name="Imagem 2">
+            <a:extLst>
+              <a:ext uri="{FF2B5EF4-FFF2-40B4-BE49-F238E27FC236}">
+                <a16:creationId xmlns:a16="http://schemas.microsoft.com/office/drawing/2014/main" id="{DB1F93E9-7637-45D1-BFFD-1CED1011F8B1}"/>
+              </a:ext>
+            </a:extLst>
+          </p:cNvPr>
+          <p:cNvPicPr>
+            <a:picLocks noChangeAspect="1"/>
+          </p:cNvPicPr>
+          <p:nvPr/>
+        </p:nvPicPr>
+        <p:blipFill>
+          <a:blip r:embed="rId2"/>
+          <a:stretch>
+            <a:fillRect/>
+          </a:stretch>
+        </p:blipFill>
+        <p:spPr>
+          <a:xfrm>
+            <a:off x="0" y="1184672"/>
+            <a:ext cx="9144000" cy="4488656"/>
+          </a:xfrm>
+          <a:prstGeom prst="rect">
+            <a:avLst/>
+          </a:prstGeom>
+        </p:spPr>
+      </p:pic>
+    </p:spTree>
+    <p:extLst>
+      <p:ext uri="{BB962C8B-B14F-4D97-AF65-F5344CB8AC3E}">
+        <p14:creationId xmlns:p14="http://schemas.microsoft.com/office/powerpoint/2010/main" val="2960243959"/>
+      </p:ext>
+    </p:extLst>
+  </p:cSld>
+  <p:clrMapOvr>
+    <a:masterClrMapping/>
+  </p:clrMapOvr>
+</p:sld>
+</file>
+
+<file path=ppt/slides/slide5.xml><?xml version="1.0" encoding="utf-8"?>
+<p:sld xmlns:a="http://schemas.openxmlformats.org/drawingml/2006/main" xmlns:r="http://schemas.openxmlformats.org/officeDocument/2006/relationships" xmlns:p="http://schemas.openxmlformats.org/presentationml/2006/main">
+  <p:cSld>
+    <p:spTree>
+      <p:nvGrpSpPr>
+        <p:cNvPr id="1" name=""/>
+        <p:cNvGrpSpPr/>
+        <p:nvPr/>
+      </p:nvGrpSpPr>
+      <p:grpSpPr>
+        <a:xfrm>
+          <a:off x="0" y="0"/>
+          <a:ext cx="0" cy="0"/>
+          <a:chOff x="0" y="0"/>
+          <a:chExt cx="0" cy="0"/>
+        </a:xfrm>
+      </p:grpSpPr>
+      <p:sp>
+        <p:nvSpPr>
+          <p:cNvPr id="5" name="Espaço Reservado para Número de Slide 4">
+            <a:extLst>
+              <a:ext uri="{FF2B5EF4-FFF2-40B4-BE49-F238E27FC236}">
+                <a16:creationId xmlns:a16="http://schemas.microsoft.com/office/drawing/2014/main" id="{C0D6E959-2109-4601-BD46-B573935DFFE9}"/>
+              </a:ext>
+            </a:extLst>
+          </p:cNvPr>
+          <p:cNvSpPr>
+            <a:spLocks noGrp="1"/>
+          </p:cNvSpPr>
+          <p:nvPr>
+            <p:ph type="sldNum" sz="quarter" idx="15"/>
+          </p:nvPr>
+        </p:nvSpPr>
+        <p:spPr/>
+        <p:txBody>
+          <a:bodyPr/>
+          <a:lstStyle/>
+          <a:p>
+            <a:fld id="{A16978B4-287B-0541-9C5D-483DA783F6CF}" type="slidenum">
+              <a:rPr lang="en-US" smtClean="0"/>
+              <a:t>5</a:t>
+            </a:fld>
+            <a:endParaRPr lang="en-US" dirty="0"/>
+          </a:p>
+        </p:txBody>
+      </p:sp>
+      <p:pic>
+        <p:nvPicPr>
+          <p:cNvPr id="3" name="Imagem 2">
+            <a:extLst>
+              <a:ext uri="{FF2B5EF4-FFF2-40B4-BE49-F238E27FC236}">
+                <a16:creationId xmlns:a16="http://schemas.microsoft.com/office/drawing/2014/main" id="{5B9BE162-3780-44FA-BAFB-DF12100DD0E3}"/>
+              </a:ext>
+            </a:extLst>
+          </p:cNvPr>
+          <p:cNvPicPr>
+            <a:picLocks noChangeAspect="1"/>
+          </p:cNvPicPr>
+          <p:nvPr/>
+        </p:nvPicPr>
+        <p:blipFill>
+          <a:blip r:embed="rId2"/>
+          <a:stretch>
+            <a:fillRect/>
+          </a:stretch>
+        </p:blipFill>
+        <p:spPr>
+          <a:xfrm>
+            <a:off x="0" y="1184672"/>
+            <a:ext cx="9144000" cy="4488656"/>
+          </a:xfrm>
+          <a:prstGeom prst="rect">
+            <a:avLst/>
+          </a:prstGeom>
+        </p:spPr>
+      </p:pic>
+    </p:spTree>
+    <p:extLst>
+      <p:ext uri="{BB962C8B-B14F-4D97-AF65-F5344CB8AC3E}">
+        <p14:creationId xmlns:p14="http://schemas.microsoft.com/office/powerpoint/2010/main" val="2202106102"/>
+      </p:ext>
+    </p:extLst>
+  </p:cSld>
+  <p:clrMapOvr>
+    <a:masterClrMapping/>
+  </p:clrMapOvr>
+</p:sld>
+</file>
+
+<file path=ppt/slides/slide6.xml><?xml version="1.0" encoding="utf-8"?>
+<p:sld xmlns:a="http://schemas.openxmlformats.org/drawingml/2006/main" xmlns:r="http://schemas.openxmlformats.org/officeDocument/2006/relationships" xmlns:p="http://schemas.openxmlformats.org/presentationml/2006/main">
+  <p:cSld>
+    <p:spTree>
+      <p:nvGrpSpPr>
+        <p:cNvPr id="1" name=""/>
+        <p:cNvGrpSpPr/>
+        <p:nvPr/>
+      </p:nvGrpSpPr>
+      <p:grpSpPr>
+        <a:xfrm>
+          <a:off x="0" y="0"/>
+          <a:ext cx="0" cy="0"/>
+          <a:chOff x="0" y="0"/>
+          <a:chExt cx="0" cy="0"/>
+        </a:xfrm>
+      </p:grpSpPr>
+      <p:sp>
+        <p:nvSpPr>
+          <p:cNvPr id="2" name="Título 1">
+            <a:extLst>
+              <a:ext uri="{FF2B5EF4-FFF2-40B4-BE49-F238E27FC236}">
+                <a16:creationId xmlns:a16="http://schemas.microsoft.com/office/drawing/2014/main" id="{672B5389-17EC-4FBC-8141-9A8AF7EA2CCB}"/>
+              </a:ext>
+            </a:extLst>
+          </p:cNvPr>
+          <p:cNvSpPr>
+            <a:spLocks noGrp="1"/>
+          </p:cNvSpPr>
+          <p:nvPr>
+            <p:ph type="title"/>
+          </p:nvPr>
+        </p:nvSpPr>
+        <p:spPr/>
+        <p:txBody>
+          <a:bodyPr>
+            <a:normAutofit fontScale="90000"/>
+          </a:bodyPr>
+          <a:lstStyle/>
+          <a:p>
+            <a:r>
+              <a:rPr lang="pt-BR" dirty="0"/>
+              <a:t>Introdução aos Filtros QMF</a:t>
+            </a:r>
+          </a:p>
+        </p:txBody>
+      </p:sp>
+      <p:sp>
+        <p:nvSpPr>
+          <p:cNvPr id="4" name="Espaço Reservado para Texto 3">
+            <a:extLst>
+              <a:ext uri="{FF2B5EF4-FFF2-40B4-BE49-F238E27FC236}">
+                <a16:creationId xmlns:a16="http://schemas.microsoft.com/office/drawing/2014/main" id="{B9CEBB5F-C6FC-4455-9EA9-91976D23023E}"/>
+              </a:ext>
+            </a:extLst>
+          </p:cNvPr>
+          <p:cNvSpPr>
+            <a:spLocks noGrp="1"/>
+          </p:cNvSpPr>
+          <p:nvPr>
+            <p:ph type="body" sz="quarter" idx="14"/>
+          </p:nvPr>
+        </p:nvSpPr>
+        <p:spPr>
+          <a:xfrm>
+            <a:off x="239184" y="1043355"/>
+            <a:ext cx="7250430" cy="4583722"/>
+          </a:xfrm>
+        </p:spPr>
+        <p:txBody>
+          <a:bodyPr/>
+          <a:lstStyle/>
+          <a:p>
+            <a:pPr marL="285750" indent="-285750">
+              <a:buFont typeface="Arial" panose="020B0604020202020204" pitchFamily="34" charset="0"/>
+              <a:buChar char="•"/>
+            </a:pPr>
+            <a:r>
+              <a:rPr lang="pt-BR" b="1" dirty="0"/>
+              <a:t>Definição:</a:t>
+            </a:r>
+            <a:br>
+              <a:rPr lang="pt-BR" dirty="0"/>
+            </a:br>
+            <a:r>
+              <a:rPr lang="pt-BR" dirty="0"/>
+              <a:t>Filtros QMF (</a:t>
+            </a:r>
+            <a:r>
+              <a:rPr lang="pt-BR" i="1" dirty="0" err="1"/>
+              <a:t>Quadrature</a:t>
+            </a:r>
+            <a:r>
+              <a:rPr lang="pt-BR" i="1" dirty="0"/>
+              <a:t> </a:t>
+            </a:r>
+            <a:r>
+              <a:rPr lang="pt-BR" i="1" dirty="0" err="1"/>
+              <a:t>Mirror</a:t>
+            </a:r>
+            <a:r>
+              <a:rPr lang="pt-BR" i="1" dirty="0"/>
+              <a:t> </a:t>
+            </a:r>
+            <a:r>
+              <a:rPr lang="pt-BR" i="1" dirty="0" err="1"/>
+              <a:t>Filters</a:t>
+            </a:r>
+            <a:r>
+              <a:rPr lang="pt-BR" dirty="0"/>
+              <a:t>) são pares de filtros projetados para dividir um sinal em </a:t>
+            </a:r>
+            <a:r>
+              <a:rPr lang="pt-BR" b="1" dirty="0" err="1"/>
+              <a:t>sub-bandas</a:t>
+            </a:r>
+            <a:r>
+              <a:rPr lang="pt-BR" b="1" dirty="0"/>
+              <a:t> complementares</a:t>
+            </a:r>
+            <a:r>
+              <a:rPr lang="pt-BR" dirty="0"/>
+              <a:t> (tipicamente </a:t>
+            </a:r>
+            <a:r>
+              <a:rPr lang="pt-BR" dirty="0" err="1"/>
+              <a:t>passa-baixas</a:t>
+            </a:r>
+            <a:r>
+              <a:rPr lang="pt-BR" dirty="0"/>
+              <a:t> e </a:t>
+            </a:r>
+            <a:r>
+              <a:rPr lang="pt-BR" dirty="0" err="1"/>
+              <a:t>passa-altas</a:t>
+            </a:r>
+            <a:r>
+              <a:rPr lang="pt-BR" dirty="0"/>
+              <a:t>), mantendo a </a:t>
+            </a:r>
+            <a:r>
+              <a:rPr lang="pt-BR" b="1" dirty="0"/>
+              <a:t>reconstrução perfeita</a:t>
+            </a:r>
+            <a:r>
+              <a:rPr lang="pt-BR" dirty="0"/>
+              <a:t> do sinal original.</a:t>
+            </a:r>
+          </a:p>
+          <a:p>
+            <a:endParaRPr lang="pt-BR" dirty="0"/>
+          </a:p>
+          <a:p>
+            <a:pPr marL="285750" indent="-285750">
+              <a:buFont typeface="Arial" panose="020B0604020202020204" pitchFamily="34" charset="0"/>
+              <a:buChar char="•"/>
+            </a:pPr>
+            <a:r>
+              <a:rPr lang="pt-BR" dirty="0"/>
+              <a:t>Objetivo:</a:t>
+            </a:r>
+          </a:p>
+          <a:p>
+            <a:pPr marL="628625" lvl="1" indent="-285750">
+              <a:buFont typeface="Arial" panose="020B0604020202020204" pitchFamily="34" charset="0"/>
+              <a:buChar char="•"/>
+            </a:pPr>
+            <a:r>
+              <a:rPr lang="pt-BR" dirty="0"/>
+              <a:t>Separar o espectro de um sinal em bandas distintas.</a:t>
+            </a:r>
+          </a:p>
+          <a:p>
+            <a:pPr marL="628625" lvl="1" indent="-285750">
+              <a:buFont typeface="Arial" panose="020B0604020202020204" pitchFamily="34" charset="0"/>
+              <a:buChar char="•"/>
+            </a:pPr>
+            <a:r>
+              <a:rPr lang="pt-BR" dirty="0"/>
+              <a:t>Reduzir a redundância.</a:t>
+            </a:r>
+          </a:p>
+          <a:p>
+            <a:pPr marL="628625" lvl="1" indent="-285750">
+              <a:buFont typeface="Arial" panose="020B0604020202020204" pitchFamily="34" charset="0"/>
+              <a:buChar char="•"/>
+            </a:pPr>
+            <a:r>
+              <a:rPr lang="pt-BR" dirty="0"/>
+              <a:t>Facilitar a compressão ou análise de componentes espectrais.</a:t>
+            </a:r>
+          </a:p>
+          <a:p>
+            <a:pPr lvl="1"/>
+            <a:endParaRPr lang="pt-BR" dirty="0"/>
+          </a:p>
+          <a:p>
+            <a:pPr marL="285750" indent="-285750">
+              <a:buFont typeface="Arial" panose="020B0604020202020204" pitchFamily="34" charset="0"/>
+              <a:buChar char="•"/>
+            </a:pPr>
+            <a:r>
+              <a:rPr lang="pt-BR" dirty="0"/>
+              <a:t>Objetivo:</a:t>
+            </a:r>
+            <a:br>
+              <a:rPr lang="pt-BR" dirty="0"/>
+            </a:br>
+            <a:r>
+              <a:rPr lang="pt-BR" dirty="0"/>
+              <a:t>Desenvolvidos para aplicações em </a:t>
+            </a:r>
+            <a:r>
+              <a:rPr lang="pt-BR" b="1" dirty="0"/>
+              <a:t>bancos de filtros</a:t>
+            </a:r>
+            <a:r>
+              <a:rPr lang="pt-BR" dirty="0"/>
+              <a:t> e </a:t>
+            </a:r>
+            <a:r>
+              <a:rPr lang="pt-BR" b="1" dirty="0"/>
+              <a:t>análise </a:t>
+            </a:r>
+            <a:r>
+              <a:rPr lang="pt-BR" b="1" dirty="0" err="1"/>
+              <a:t>multirresolução</a:t>
+            </a:r>
+            <a:r>
+              <a:rPr lang="pt-BR" dirty="0"/>
+              <a:t> (como a transformada </a:t>
+            </a:r>
+            <a:r>
+              <a:rPr lang="pt-BR" dirty="0" err="1"/>
+              <a:t>wavelet</a:t>
+            </a:r>
+            <a:r>
+              <a:rPr lang="pt-BR" dirty="0"/>
+              <a:t>).</a:t>
+            </a:r>
+          </a:p>
+          <a:p>
+            <a:endParaRPr lang="pt-BR" dirty="0"/>
+          </a:p>
+        </p:txBody>
+      </p:sp>
+      <p:sp>
+        <p:nvSpPr>
+          <p:cNvPr id="5" name="Espaço Reservado para Número de Slide 4">
+            <a:extLst>
+              <a:ext uri="{FF2B5EF4-FFF2-40B4-BE49-F238E27FC236}">
+                <a16:creationId xmlns:a16="http://schemas.microsoft.com/office/drawing/2014/main" id="{237C6F17-B3D3-48CF-A3D6-B1370E41D814}"/>
+              </a:ext>
+            </a:extLst>
+          </p:cNvPr>
+          <p:cNvSpPr>
+            <a:spLocks noGrp="1"/>
+          </p:cNvSpPr>
+          <p:nvPr>
+            <p:ph type="sldNum" sz="quarter" idx="15"/>
+          </p:nvPr>
+        </p:nvSpPr>
+        <p:spPr/>
+        <p:txBody>
+          <a:bodyPr/>
+          <a:lstStyle/>
+          <a:p>
+            <a:fld id="{A16978B4-287B-0541-9C5D-483DA783F6CF}" type="slidenum">
+              <a:rPr lang="en-US" smtClean="0"/>
+              <a:t>6</a:t>
+            </a:fld>
+            <a:endParaRPr lang="en-US" dirty="0"/>
+          </a:p>
+        </p:txBody>
+      </p:sp>
+    </p:spTree>
+    <p:extLst>
+      <p:ext uri="{BB962C8B-B14F-4D97-AF65-F5344CB8AC3E}">
+        <p14:creationId xmlns:p14="http://schemas.microsoft.com/office/powerpoint/2010/main" val="79631331"/>
+      </p:ext>
+    </p:extLst>
+  </p:cSld>
+  <p:clrMapOvr>
+    <a:masterClrMapping/>
+  </p:clrMapOvr>
+</p:sld>
+</file>
+
+<file path=ppt/slides/slide7.xml><?xml version="1.0" encoding="utf-8"?>
+<p:sld xmlns:a="http://schemas.openxmlformats.org/drawingml/2006/main" xmlns:r="http://schemas.openxmlformats.org/officeDocument/2006/relationships" xmlns:p="http://schemas.openxmlformats.org/presentationml/2006/main">
+  <p:cSld>
+    <p:spTree>
+      <p:nvGrpSpPr>
+        <p:cNvPr id="1" name=""/>
+        <p:cNvGrpSpPr/>
+        <p:nvPr/>
+      </p:nvGrpSpPr>
+      <p:grpSpPr>
+        <a:xfrm>
+          <a:off x="0" y="0"/>
+          <a:ext cx="0" cy="0"/>
+          <a:chOff x="0" y="0"/>
+          <a:chExt cx="0" cy="0"/>
+        </a:xfrm>
+      </p:grpSpPr>
+      <p:sp>
+        <p:nvSpPr>
           <p:cNvPr id="2" name="Título 1">
             <a:extLst>
               <a:ext uri="{FF2B5EF4-FFF2-40B4-BE49-F238E27FC236}">
@@ -27984,7 +29727,7 @@
           <a:p>
             <a:fld id="{A16978B4-287B-0541-9C5D-483DA783F6CF}" type="slidenum">
               <a:rPr lang="en-US" smtClean="0"/>
-              <a:t>3</a:t>
+              <a:t>7</a:t>
             </a:fld>
             <a:endParaRPr lang="en-US" dirty="0"/>
           </a:p>
@@ -28019,8 +29762,8 @@
           </a:xfrm>
         </p:spPr>
       </p:pic>
-      <mc:AlternateContent xmlns:mc="http://schemas.openxmlformats.org/markup-compatibility/2006">
-        <mc:Choice xmlns:a14="http://schemas.microsoft.com/office/drawing/2010/main" Requires="a14">
+      <mc:AlternateContent xmlns:mc="http://schemas.openxmlformats.org/markup-compatibility/2006" xmlns:a14="http://schemas.microsoft.com/office/drawing/2010/main">
+        <mc:Choice Requires="a14">
           <p:sp>
             <p:nvSpPr>
               <p:cNvPr id="16" name="Rectangle 7">
@@ -28485,7 +30228,7 @@
             </p:txBody>
           </p:sp>
         </mc:Choice>
-        <mc:Fallback>
+        <mc:Fallback xmlns="">
           <p:sp>
             <p:nvSpPr>
               <p:cNvPr id="16" name="Rectangle 7">
@@ -28577,7 +30320,7 @@
 </p:sld>
 </file>
 
-<file path=ppt/slides/slide4.xml><?xml version="1.0" encoding="utf-8"?>
+<file path=ppt/slides/slide8.xml><?xml version="1.0" encoding="utf-8"?>
 <p:sld xmlns:a="http://schemas.openxmlformats.org/drawingml/2006/main" xmlns:r="http://schemas.openxmlformats.org/officeDocument/2006/relationships" xmlns:p="http://schemas.openxmlformats.org/presentationml/2006/main">
   <p:cSld>
     <p:spTree>
@@ -28640,8 +30383,8 @@
           </a:p>
         </p:txBody>
       </p:sp>
-      <mc:AlternateContent xmlns:mc="http://schemas.openxmlformats.org/markup-compatibility/2006">
-        <mc:Choice xmlns:a14="http://schemas.microsoft.com/office/drawing/2010/main" Requires="a14">
+      <mc:AlternateContent xmlns:mc="http://schemas.openxmlformats.org/markup-compatibility/2006" xmlns:a14="http://schemas.microsoft.com/office/drawing/2010/main">
+        <mc:Choice Requires="a14">
           <p:sp>
             <p:nvSpPr>
               <p:cNvPr id="9" name="Espaço Reservado para Texto 8">
@@ -28838,7 +30581,7 @@
             </p:txBody>
           </p:sp>
         </mc:Choice>
-        <mc:Fallback>
+        <mc:Fallback xmlns="">
           <p:sp>
             <p:nvSpPr>
               <p:cNvPr id="9" name="Espaço Reservado para Texto 8">
@@ -28905,7 +30648,7 @@
           <a:p>
             <a:fld id="{A16978B4-287B-0541-9C5D-483DA783F6CF}" type="slidenum">
               <a:rPr lang="en-US" smtClean="0"/>
-              <a:t>4</a:t>
+              <a:t>8</a:t>
             </a:fld>
             <a:endParaRPr lang="en-US" dirty="0"/>
           </a:p>
@@ -28924,7 +30667,7 @@
 </p:sld>
 </file>
 
-<file path=ppt/slides/slide5.xml><?xml version="1.0" encoding="utf-8"?>
+<file path=ppt/slides/slide9.xml><?xml version="1.0" encoding="utf-8"?>
 <p:sld xmlns:a="http://schemas.openxmlformats.org/drawingml/2006/main" xmlns:r="http://schemas.openxmlformats.org/officeDocument/2006/relationships" xmlns:p="http://schemas.openxmlformats.org/presentationml/2006/main">
   <p:cSld>
     <p:spTree>
@@ -28987,8 +30730,8 @@
           </a:p>
         </p:txBody>
       </p:sp>
-      <mc:AlternateContent xmlns:mc="http://schemas.openxmlformats.org/markup-compatibility/2006">
-        <mc:Choice xmlns:a14="http://schemas.microsoft.com/office/drawing/2010/main" Requires="a14">
+      <mc:AlternateContent xmlns:mc="http://schemas.openxmlformats.org/markup-compatibility/2006" xmlns:a14="http://schemas.microsoft.com/office/drawing/2010/main">
+        <mc:Choice Requires="a14">
           <p:sp>
             <p:nvSpPr>
               <p:cNvPr id="9" name="Espaço Reservado para Texto 8">
@@ -29285,7 +31028,7 @@
             </p:txBody>
           </p:sp>
         </mc:Choice>
-        <mc:Fallback>
+        <mc:Fallback xmlns="">
           <p:sp>
             <p:nvSpPr>
               <p:cNvPr id="9" name="Espaço Reservado para Texto 8">
@@ -29352,7 +31095,7 @@
           <a:p>
             <a:fld id="{A16978B4-287B-0541-9C5D-483DA783F6CF}" type="slidenum">
               <a:rPr lang="en-US" smtClean="0"/>
-              <a:t>5</a:t>
+              <a:t>9</a:t>
             </a:fld>
             <a:endParaRPr lang="en-US" dirty="0"/>
           </a:p>
@@ -29362,1300 +31105,6 @@
     <p:extLst>
       <p:ext uri="{BB962C8B-B14F-4D97-AF65-F5344CB8AC3E}">
         <p14:creationId xmlns:p14="http://schemas.microsoft.com/office/powerpoint/2010/main" val="3397392447"/>
-      </p:ext>
-    </p:extLst>
-  </p:cSld>
-  <p:clrMapOvr>
-    <a:masterClrMapping/>
-  </p:clrMapOvr>
-</p:sld>
-</file>
-
-<file path=ppt/slides/slide6.xml><?xml version="1.0" encoding="utf-8"?>
-<p:sld xmlns:a="http://schemas.openxmlformats.org/drawingml/2006/main" xmlns:r="http://schemas.openxmlformats.org/officeDocument/2006/relationships" xmlns:p="http://schemas.openxmlformats.org/presentationml/2006/main">
-  <p:cSld>
-    <p:spTree>
-      <p:nvGrpSpPr>
-        <p:cNvPr id="1" name=""/>
-        <p:cNvGrpSpPr/>
-        <p:nvPr/>
-      </p:nvGrpSpPr>
-      <p:grpSpPr>
-        <a:xfrm>
-          <a:off x="0" y="0"/>
-          <a:ext cx="0" cy="0"/>
-          <a:chOff x="0" y="0"/>
-          <a:chExt cx="0" cy="0"/>
-        </a:xfrm>
-      </p:grpSpPr>
-      <p:sp>
-        <p:nvSpPr>
-          <p:cNvPr id="2" name="Título 1">
-            <a:extLst>
-              <a:ext uri="{FF2B5EF4-FFF2-40B4-BE49-F238E27FC236}">
-                <a16:creationId xmlns:a16="http://schemas.microsoft.com/office/drawing/2014/main" id="{80A3EDF8-6915-4E59-99C8-6E887ECA49E4}"/>
-              </a:ext>
-            </a:extLst>
-          </p:cNvPr>
-          <p:cNvSpPr>
-            <a:spLocks noGrp="1"/>
-          </p:cNvSpPr>
-          <p:nvPr>
-            <p:ph type="title"/>
-          </p:nvPr>
-        </p:nvSpPr>
-        <p:spPr/>
-        <p:txBody>
-          <a:bodyPr>
-            <a:normAutofit fontScale="90000"/>
-          </a:bodyPr>
-          <a:lstStyle/>
-          <a:p>
-            <a:r>
-              <a:rPr lang="pt-BR" dirty="0"/>
-              <a:t>Decomposição Multiaxial / Multivariável</a:t>
-            </a:r>
-          </a:p>
-        </p:txBody>
-      </p:sp>
-      <p:sp>
-        <p:nvSpPr>
-          <p:cNvPr id="4" name="Espaço Reservado para Texto 3">
-            <a:extLst>
-              <a:ext uri="{FF2B5EF4-FFF2-40B4-BE49-F238E27FC236}">
-                <a16:creationId xmlns:a16="http://schemas.microsoft.com/office/drawing/2014/main" id="{8ADE41B2-13AA-4430-8A2C-AE98AB3D3BA7}"/>
-              </a:ext>
-            </a:extLst>
-          </p:cNvPr>
-          <p:cNvSpPr>
-            <a:spLocks noGrp="1"/>
-          </p:cNvSpPr>
-          <p:nvPr>
-            <p:ph type="body" sz="quarter" idx="14"/>
-          </p:nvPr>
-        </p:nvSpPr>
-        <p:spPr>
-          <a:xfrm>
-            <a:off x="236054" y="954794"/>
-            <a:ext cx="6964255" cy="1794578"/>
-          </a:xfrm>
-        </p:spPr>
-        <p:txBody>
-          <a:bodyPr>
-            <a:normAutofit lnSpcReduction="10000"/>
-          </a:bodyPr>
-          <a:lstStyle/>
-          <a:p>
-            <a:r>
-              <a:rPr lang="pt-BR" b="1" dirty="0"/>
-              <a:t>Decomposição Multiaxial (ou Multinível):</a:t>
-            </a:r>
-            <a:endParaRPr lang="pt-BR" dirty="0"/>
-          </a:p>
-          <a:p>
-            <a:pPr>
-              <a:buFont typeface="Arial" panose="020B0604020202020204" pitchFamily="34" charset="0"/>
-              <a:buChar char="•"/>
-            </a:pPr>
-            <a:r>
-              <a:rPr lang="pt-BR" dirty="0"/>
-              <a:t>Processo iterativo de aplicar o banco de filtros </a:t>
-            </a:r>
-            <a:r>
-              <a:rPr lang="pt-BR" b="1" dirty="0"/>
-              <a:t>em cada </a:t>
-            </a:r>
-            <a:r>
-              <a:rPr lang="pt-BR" b="1" dirty="0" err="1"/>
-              <a:t>subbanda</a:t>
-            </a:r>
-            <a:r>
-              <a:rPr lang="pt-BR" dirty="0"/>
-              <a:t>.</a:t>
-            </a:r>
-          </a:p>
-          <a:p>
-            <a:pPr>
-              <a:buFont typeface="Arial" panose="020B0604020202020204" pitchFamily="34" charset="0"/>
-              <a:buChar char="•"/>
-            </a:pPr>
-            <a:r>
-              <a:rPr lang="pt-BR" dirty="0"/>
-              <a:t>Permite representar o sinal em </a:t>
-            </a:r>
-            <a:r>
-              <a:rPr lang="pt-BR" b="1" dirty="0"/>
-              <a:t>múltiplas resoluções</a:t>
-            </a:r>
-            <a:r>
-              <a:rPr lang="pt-BR" dirty="0"/>
-              <a:t> (frequências).</a:t>
-            </a:r>
-          </a:p>
-          <a:p>
-            <a:endParaRPr lang="pt-BR" dirty="0"/>
-          </a:p>
-          <a:p>
-            <a:r>
-              <a:rPr lang="pt-BR" dirty="0"/>
-              <a:t>Exemplo (nível 2):</a:t>
-            </a:r>
-          </a:p>
-          <a:p>
-            <a:endParaRPr lang="pt-BR" dirty="0"/>
-          </a:p>
-        </p:txBody>
-      </p:sp>
-      <p:sp>
-        <p:nvSpPr>
-          <p:cNvPr id="5" name="Espaço Reservado para Número de Slide 4">
-            <a:extLst>
-              <a:ext uri="{FF2B5EF4-FFF2-40B4-BE49-F238E27FC236}">
-                <a16:creationId xmlns:a16="http://schemas.microsoft.com/office/drawing/2014/main" id="{244BEEBB-75D9-4D8D-879B-CF65AA7027A2}"/>
-              </a:ext>
-            </a:extLst>
-          </p:cNvPr>
-          <p:cNvSpPr>
-            <a:spLocks noGrp="1"/>
-          </p:cNvSpPr>
-          <p:nvPr>
-            <p:ph type="sldNum" sz="quarter" idx="15"/>
-          </p:nvPr>
-        </p:nvSpPr>
-        <p:spPr/>
-        <p:txBody>
-          <a:bodyPr/>
-          <a:lstStyle/>
-          <a:p>
-            <a:fld id="{A16978B4-287B-0541-9C5D-483DA783F6CF}" type="slidenum">
-              <a:rPr lang="en-US" smtClean="0"/>
-              <a:t>6</a:t>
-            </a:fld>
-            <a:endParaRPr lang="en-US" dirty="0"/>
-          </a:p>
-        </p:txBody>
-      </p:sp>
-      <p:pic>
-        <p:nvPicPr>
-          <p:cNvPr id="8" name="Espaço Reservado para Conteúdo 7">
-            <a:extLst>
-              <a:ext uri="{FF2B5EF4-FFF2-40B4-BE49-F238E27FC236}">
-                <a16:creationId xmlns:a16="http://schemas.microsoft.com/office/drawing/2014/main" id="{45B71935-0AD4-4370-B67B-834F4C4AE7FF}"/>
-              </a:ext>
-            </a:extLst>
-          </p:cNvPr>
-          <p:cNvPicPr>
-            <a:picLocks noGrp="1" noChangeAspect="1"/>
-          </p:cNvPicPr>
-          <p:nvPr>
-            <p:ph sz="quarter" idx="17"/>
-          </p:nvPr>
-        </p:nvPicPr>
-        <p:blipFill>
-          <a:blip r:embed="rId2"/>
-          <a:stretch>
-            <a:fillRect/>
-          </a:stretch>
-        </p:blipFill>
-        <p:spPr>
-          <a:xfrm>
-            <a:off x="889393" y="2820492"/>
-            <a:ext cx="7365213" cy="2559657"/>
-          </a:xfrm>
-        </p:spPr>
-      </p:pic>
-    </p:spTree>
-    <p:extLst>
-      <p:ext uri="{BB962C8B-B14F-4D97-AF65-F5344CB8AC3E}">
-        <p14:creationId xmlns:p14="http://schemas.microsoft.com/office/powerpoint/2010/main" val="1104506783"/>
-      </p:ext>
-    </p:extLst>
-  </p:cSld>
-  <p:clrMapOvr>
-    <a:masterClrMapping/>
-  </p:clrMapOvr>
-</p:sld>
-</file>
-
-<file path=ppt/slides/slide7.xml><?xml version="1.0" encoding="utf-8"?>
-<p:sld xmlns:a="http://schemas.openxmlformats.org/drawingml/2006/main" xmlns:r="http://schemas.openxmlformats.org/officeDocument/2006/relationships" xmlns:p="http://schemas.openxmlformats.org/presentationml/2006/main">
-  <p:cSld>
-    <p:spTree>
-      <p:nvGrpSpPr>
-        <p:cNvPr id="1" name=""/>
-        <p:cNvGrpSpPr/>
-        <p:nvPr/>
-      </p:nvGrpSpPr>
-      <p:grpSpPr>
-        <a:xfrm>
-          <a:off x="0" y="0"/>
-          <a:ext cx="0" cy="0"/>
-          <a:chOff x="0" y="0"/>
-          <a:chExt cx="0" cy="0"/>
-        </a:xfrm>
-      </p:grpSpPr>
-      <p:sp>
-        <p:nvSpPr>
-          <p:cNvPr id="9" name="Espaço Reservado para Texto 8">
-            <a:extLst>
-              <a:ext uri="{FF2B5EF4-FFF2-40B4-BE49-F238E27FC236}">
-                <a16:creationId xmlns:a16="http://schemas.microsoft.com/office/drawing/2014/main" id="{D7251D9B-1C7D-4247-ACE7-368F07122B3D}"/>
-              </a:ext>
-            </a:extLst>
-          </p:cNvPr>
-          <p:cNvSpPr>
-            <a:spLocks noGrp="1"/>
-          </p:cNvSpPr>
-          <p:nvPr>
-            <p:ph type="body" sz="quarter" idx="14"/>
-          </p:nvPr>
-        </p:nvSpPr>
-        <p:spPr>
-          <a:xfrm>
-            <a:off x="946785" y="1398735"/>
-            <a:ext cx="7250430" cy="3553427"/>
-          </a:xfrm>
-        </p:spPr>
-        <p:txBody>
-          <a:bodyPr/>
-          <a:lstStyle/>
-          <a:p>
-            <a:r>
-              <a:rPr lang="pt-BR" b="1" dirty="0"/>
-              <a:t>Decomposição Multivariável:</a:t>
-            </a:r>
-            <a:endParaRPr lang="pt-BR" dirty="0"/>
-          </a:p>
-          <a:p>
-            <a:pPr>
-              <a:buFont typeface="Arial" panose="020B0604020202020204" pitchFamily="34" charset="0"/>
-              <a:buChar char="•"/>
-            </a:pPr>
-            <a:r>
-              <a:rPr lang="pt-BR" dirty="0"/>
-              <a:t>Extensão para sinais com mais de uma dimensão (ex.: imagens 2D).</a:t>
-            </a:r>
-          </a:p>
-          <a:p>
-            <a:pPr>
-              <a:buFont typeface="Arial" panose="020B0604020202020204" pitchFamily="34" charset="0"/>
-              <a:buChar char="•"/>
-            </a:pPr>
-            <a:r>
-              <a:rPr lang="pt-BR" dirty="0"/>
-              <a:t>Aplica os filtros QMF nas </a:t>
-            </a:r>
-            <a:r>
-              <a:rPr lang="pt-BR" b="1" dirty="0"/>
-              <a:t>linhas e colunas</a:t>
-            </a:r>
-            <a:r>
-              <a:rPr lang="pt-BR" dirty="0"/>
-              <a:t> separadamente.</a:t>
-            </a:r>
-          </a:p>
-          <a:p>
-            <a:pPr>
-              <a:buFont typeface="Arial" panose="020B0604020202020204" pitchFamily="34" charset="0"/>
-              <a:buChar char="•"/>
-            </a:pPr>
-            <a:r>
-              <a:rPr lang="pt-BR" dirty="0"/>
-              <a:t>Forma as </a:t>
-            </a:r>
-            <a:r>
-              <a:rPr lang="pt-BR" dirty="0" err="1"/>
-              <a:t>sub-bandas</a:t>
-            </a:r>
-            <a:r>
-              <a:rPr lang="pt-BR" dirty="0"/>
-              <a:t>:</a:t>
-            </a:r>
-          </a:p>
-          <a:p>
-            <a:pPr marL="742950" lvl="1" indent="-285750">
-              <a:buFont typeface="Arial" panose="020B0604020202020204" pitchFamily="34" charset="0"/>
-              <a:buChar char="•"/>
-            </a:pPr>
-            <a:r>
-              <a:rPr lang="pt-BR" dirty="0"/>
-              <a:t>LL (</a:t>
-            </a:r>
-            <a:r>
-              <a:rPr lang="pt-BR" dirty="0" err="1"/>
-              <a:t>baixa-baixa</a:t>
-            </a:r>
-            <a:r>
-              <a:rPr lang="pt-BR" dirty="0"/>
-              <a:t>)</a:t>
-            </a:r>
-          </a:p>
-          <a:p>
-            <a:pPr marL="742950" lvl="1" indent="-285750">
-              <a:buFont typeface="Arial" panose="020B0604020202020204" pitchFamily="34" charset="0"/>
-              <a:buChar char="•"/>
-            </a:pPr>
-            <a:r>
-              <a:rPr lang="pt-BR" dirty="0"/>
-              <a:t>LH (</a:t>
-            </a:r>
-            <a:r>
-              <a:rPr lang="pt-BR" dirty="0" err="1"/>
-              <a:t>baixa-alta</a:t>
-            </a:r>
-            <a:r>
-              <a:rPr lang="pt-BR" dirty="0"/>
-              <a:t>)</a:t>
-            </a:r>
-          </a:p>
-          <a:p>
-            <a:pPr marL="742950" lvl="1" indent="-285750">
-              <a:buFont typeface="Arial" panose="020B0604020202020204" pitchFamily="34" charset="0"/>
-              <a:buChar char="•"/>
-            </a:pPr>
-            <a:r>
-              <a:rPr lang="pt-BR" dirty="0"/>
-              <a:t>HL (alta-baixa)</a:t>
-            </a:r>
-          </a:p>
-          <a:p>
-            <a:pPr marL="742950" lvl="1" indent="-285750">
-              <a:buFont typeface="Arial" panose="020B0604020202020204" pitchFamily="34" charset="0"/>
-              <a:buChar char="•"/>
-            </a:pPr>
-            <a:r>
-              <a:rPr lang="pt-BR" dirty="0"/>
-              <a:t>HH (alta-alta)</a:t>
-            </a:r>
-          </a:p>
-          <a:p>
-            <a:pPr>
-              <a:buFont typeface="Arial" panose="020B0604020202020204" pitchFamily="34" charset="0"/>
-              <a:buChar char="•"/>
-            </a:pPr>
-            <a:r>
-              <a:rPr lang="pt-BR" b="1" dirty="0"/>
-              <a:t>Usada em compressão de imagem (JPEG2000, por exemplo).</a:t>
-            </a:r>
-            <a:endParaRPr lang="pt-BR" dirty="0"/>
-          </a:p>
-          <a:p>
-            <a:endParaRPr lang="pt-BR" dirty="0"/>
-          </a:p>
-        </p:txBody>
-      </p:sp>
-      <p:sp>
-        <p:nvSpPr>
-          <p:cNvPr id="5" name="Espaço Reservado para Número de Slide 4">
-            <a:extLst>
-              <a:ext uri="{FF2B5EF4-FFF2-40B4-BE49-F238E27FC236}">
-                <a16:creationId xmlns:a16="http://schemas.microsoft.com/office/drawing/2014/main" id="{135C28DA-D785-4CEB-ABE5-DDFE31BA5BEB}"/>
-              </a:ext>
-            </a:extLst>
-          </p:cNvPr>
-          <p:cNvSpPr>
-            <a:spLocks noGrp="1"/>
-          </p:cNvSpPr>
-          <p:nvPr>
-            <p:ph type="sldNum" sz="quarter" idx="15"/>
-          </p:nvPr>
-        </p:nvSpPr>
-        <p:spPr/>
-        <p:txBody>
-          <a:bodyPr/>
-          <a:lstStyle/>
-          <a:p>
-            <a:fld id="{A16978B4-287B-0541-9C5D-483DA783F6CF}" type="slidenum">
-              <a:rPr lang="en-US" smtClean="0"/>
-              <a:t>7</a:t>
-            </a:fld>
-            <a:endParaRPr lang="en-US" dirty="0"/>
-          </a:p>
-        </p:txBody>
-      </p:sp>
-    </p:spTree>
-    <p:extLst>
-      <p:ext uri="{BB962C8B-B14F-4D97-AF65-F5344CB8AC3E}">
-        <p14:creationId xmlns:p14="http://schemas.microsoft.com/office/powerpoint/2010/main" val="2217385567"/>
-      </p:ext>
-    </p:extLst>
-  </p:cSld>
-  <p:clrMapOvr>
-    <a:masterClrMapping/>
-  </p:clrMapOvr>
-</p:sld>
-</file>
-
-<file path=ppt/slides/slide8.xml><?xml version="1.0" encoding="utf-8"?>
-<p:sld xmlns:a="http://schemas.openxmlformats.org/drawingml/2006/main" xmlns:r="http://schemas.openxmlformats.org/officeDocument/2006/relationships" xmlns:p="http://schemas.openxmlformats.org/presentationml/2006/main">
-  <p:cSld>
-    <p:spTree>
-      <p:nvGrpSpPr>
-        <p:cNvPr id="1" name=""/>
-        <p:cNvGrpSpPr/>
-        <p:nvPr/>
-      </p:nvGrpSpPr>
-      <p:grpSpPr>
-        <a:xfrm>
-          <a:off x="0" y="0"/>
-          <a:ext cx="0" cy="0"/>
-          <a:chOff x="0" y="0"/>
-          <a:chExt cx="0" cy="0"/>
-        </a:xfrm>
-      </p:grpSpPr>
-      <p:sp>
-        <p:nvSpPr>
-          <p:cNvPr id="2" name="Título 1">
-            <a:extLst>
-              <a:ext uri="{FF2B5EF4-FFF2-40B4-BE49-F238E27FC236}">
-                <a16:creationId xmlns:a16="http://schemas.microsoft.com/office/drawing/2014/main" id="{C35CB187-3982-4369-A10C-102D588E64A6}"/>
-              </a:ext>
-            </a:extLst>
-          </p:cNvPr>
-          <p:cNvSpPr>
-            <a:spLocks noGrp="1"/>
-          </p:cNvSpPr>
-          <p:nvPr>
-            <p:ph type="title"/>
-          </p:nvPr>
-        </p:nvSpPr>
-        <p:spPr/>
-        <p:txBody>
-          <a:bodyPr>
-            <a:normAutofit fontScale="90000"/>
-          </a:bodyPr>
-          <a:lstStyle/>
-          <a:p>
-            <a:r>
-              <a:rPr lang="pt-BR" dirty="0"/>
-              <a:t>Porque não deu certo?</a:t>
-            </a:r>
-          </a:p>
-        </p:txBody>
-      </p:sp>
-      <mc:AlternateContent xmlns:mc="http://schemas.openxmlformats.org/markup-compatibility/2006">
-        <mc:Choice xmlns:a14="http://schemas.microsoft.com/office/drawing/2010/main" Requires="a14">
-          <p:sp>
-            <p:nvSpPr>
-              <p:cNvPr id="3" name="Espaço Reservado para Texto 2">
-                <a:extLst>
-                  <a:ext uri="{FF2B5EF4-FFF2-40B4-BE49-F238E27FC236}">
-                    <a16:creationId xmlns:a16="http://schemas.microsoft.com/office/drawing/2014/main" id="{65CC17D8-6154-4E85-927B-5D4D58C85EF1}"/>
-                  </a:ext>
-                </a:extLst>
-              </p:cNvPr>
-              <p:cNvSpPr>
-                <a:spLocks noGrp="1"/>
-              </p:cNvSpPr>
-              <p:nvPr>
-                <p:ph type="body" sz="quarter" idx="13"/>
-              </p:nvPr>
-            </p:nvSpPr>
-            <p:spPr/>
-            <p:txBody>
-              <a:bodyPr>
-                <a:normAutofit fontScale="85000" lnSpcReduction="20000"/>
-              </a:bodyPr>
-              <a:lstStyle/>
-              <a:p>
-                <a:r>
-                  <a:rPr lang="pt-BR" dirty="0"/>
-                  <a:t>Compensar o atraso (</a:t>
-                </a:r>
-                <a14:m>
-                  <m:oMath xmlns:m="http://schemas.openxmlformats.org/officeDocument/2006/math">
-                    <m:sSup>
-                      <m:sSupPr>
-                        <m:ctrlPr>
-                          <a:rPr lang="pt-BR" i="1" smtClean="0">
-                            <a:latin typeface="Cambria Math" panose="02040503050406030204" pitchFamily="18" charset="0"/>
-                          </a:rPr>
-                        </m:ctrlPr>
-                      </m:sSupPr>
-                      <m:e>
-                        <m:r>
-                          <a:rPr lang="pt-BR" b="0" i="1" smtClean="0">
-                            <a:latin typeface="Cambria Math" panose="02040503050406030204" pitchFamily="18" charset="0"/>
-                          </a:rPr>
-                          <m:t>𝑍</m:t>
-                        </m:r>
-                      </m:e>
-                      <m:sup>
-                        <m:r>
-                          <a:rPr lang="pt-BR" b="0" i="1" smtClean="0">
-                            <a:latin typeface="Cambria Math" panose="02040503050406030204" pitchFamily="18" charset="0"/>
-                          </a:rPr>
-                          <m:t>−</m:t>
-                        </m:r>
-                        <m:r>
-                          <a:rPr lang="pt-BR" b="0" i="1" smtClean="0">
-                            <a:latin typeface="Cambria Math" panose="02040503050406030204" pitchFamily="18" charset="0"/>
-                          </a:rPr>
-                          <m:t>𝑘</m:t>
-                        </m:r>
-                      </m:sup>
-                    </m:sSup>
-                  </m:oMath>
-                </a14:m>
-                <a:r>
-                  <a:rPr lang="pt-BR" dirty="0"/>
-                  <a:t>): </a:t>
-                </a:r>
-              </a:p>
-            </p:txBody>
-          </p:sp>
-        </mc:Choice>
-        <mc:Fallback>
-          <p:sp>
-            <p:nvSpPr>
-              <p:cNvPr id="3" name="Espaço Reservado para Texto 2">
-                <a:extLst>
-                  <a:ext uri="{FF2B5EF4-FFF2-40B4-BE49-F238E27FC236}">
-                    <a16:creationId xmlns:a16="http://schemas.microsoft.com/office/drawing/2014/main" id="{65CC17D8-6154-4E85-927B-5D4D58C85EF1}"/>
-                  </a:ext>
-                </a:extLst>
-              </p:cNvPr>
-              <p:cNvSpPr>
-                <a:spLocks noGrp="1" noRot="1" noChangeAspect="1" noMove="1" noResize="1" noEditPoints="1" noAdjustHandles="1" noChangeArrowheads="1" noChangeShapeType="1" noTextEdit="1"/>
-              </p:cNvSpPr>
-              <p:nvPr>
-                <p:ph type="body" sz="quarter" idx="13"/>
-              </p:nvPr>
-            </p:nvSpPr>
-            <p:spPr>
-              <a:blipFill>
-                <a:blip r:embed="rId2"/>
-                <a:stretch>
-                  <a:fillRect l="-840" t="-31481" b="-31481"/>
-                </a:stretch>
-              </a:blipFill>
-            </p:spPr>
-            <p:txBody>
-              <a:bodyPr/>
-              <a:lstStyle/>
-              <a:p>
-                <a:r>
-                  <a:rPr lang="pt-BR">
-                    <a:noFill/>
-                  </a:rPr>
-                  <a:t> </a:t>
-                </a:r>
-              </a:p>
-            </p:txBody>
-          </p:sp>
-        </mc:Fallback>
-      </mc:AlternateContent>
-      <p:sp>
-        <p:nvSpPr>
-          <p:cNvPr id="4" name="Espaço Reservado para Texto 3">
-            <a:extLst>
-              <a:ext uri="{FF2B5EF4-FFF2-40B4-BE49-F238E27FC236}">
-                <a16:creationId xmlns:a16="http://schemas.microsoft.com/office/drawing/2014/main" id="{A1E51E9A-F205-460A-AD26-A41DA8B3C5BF}"/>
-              </a:ext>
-            </a:extLst>
-          </p:cNvPr>
-          <p:cNvSpPr>
-            <a:spLocks noGrp="1"/>
-          </p:cNvSpPr>
-          <p:nvPr>
-            <p:ph type="body" sz="quarter" idx="14"/>
-          </p:nvPr>
-        </p:nvSpPr>
-        <p:spPr/>
-        <p:txBody>
-          <a:bodyPr/>
-          <a:lstStyle/>
-          <a:p>
-            <a:endParaRPr lang="pt-BR" dirty="0"/>
-          </a:p>
-        </p:txBody>
-      </p:sp>
-      <p:sp>
-        <p:nvSpPr>
-          <p:cNvPr id="5" name="Espaço Reservado para Número de Slide 4">
-            <a:extLst>
-              <a:ext uri="{FF2B5EF4-FFF2-40B4-BE49-F238E27FC236}">
-                <a16:creationId xmlns:a16="http://schemas.microsoft.com/office/drawing/2014/main" id="{A6D99C4B-6E7B-43A5-8420-54E323F7C79B}"/>
-              </a:ext>
-            </a:extLst>
-          </p:cNvPr>
-          <p:cNvSpPr>
-            <a:spLocks noGrp="1"/>
-          </p:cNvSpPr>
-          <p:nvPr>
-            <p:ph type="sldNum" sz="quarter" idx="15"/>
-          </p:nvPr>
-        </p:nvSpPr>
-        <p:spPr/>
-        <p:txBody>
-          <a:bodyPr/>
-          <a:lstStyle/>
-          <a:p>
-            <a:fld id="{A16978B4-287B-0541-9C5D-483DA783F6CF}" type="slidenum">
-              <a:rPr lang="en-US" smtClean="0"/>
-              <a:t>8</a:t>
-            </a:fld>
-            <a:endParaRPr lang="en-US" dirty="0"/>
-          </a:p>
-        </p:txBody>
-      </p:sp>
-      <p:pic>
-        <p:nvPicPr>
-          <p:cNvPr id="7" name="Imagem 6">
-            <a:extLst>
-              <a:ext uri="{FF2B5EF4-FFF2-40B4-BE49-F238E27FC236}">
-                <a16:creationId xmlns:a16="http://schemas.microsoft.com/office/drawing/2014/main" id="{84716439-3A7C-41BB-BCAE-A56BA1FC6CEE}"/>
-              </a:ext>
-            </a:extLst>
-          </p:cNvPr>
-          <p:cNvPicPr>
-            <a:picLocks noChangeAspect="1"/>
-          </p:cNvPicPr>
-          <p:nvPr/>
-        </p:nvPicPr>
-        <p:blipFill>
-          <a:blip r:embed="rId3"/>
-          <a:stretch>
-            <a:fillRect/>
-          </a:stretch>
-        </p:blipFill>
-        <p:spPr>
-          <a:xfrm>
-            <a:off x="119592" y="1400200"/>
-            <a:ext cx="8904816" cy="4057599"/>
-          </a:xfrm>
-          <a:prstGeom prst="rect">
-            <a:avLst/>
-          </a:prstGeom>
-        </p:spPr>
-      </p:pic>
-    </p:spTree>
-    <p:extLst>
-      <p:ext uri="{BB962C8B-B14F-4D97-AF65-F5344CB8AC3E}">
-        <p14:creationId xmlns:p14="http://schemas.microsoft.com/office/powerpoint/2010/main" val="716550864"/>
-      </p:ext>
-    </p:extLst>
-  </p:cSld>
-  <p:clrMapOvr>
-    <a:masterClrMapping/>
-  </p:clrMapOvr>
-</p:sld>
-</file>
-
-<file path=ppt/slides/slide9.xml><?xml version="1.0" encoding="utf-8"?>
-<p:sld xmlns:a="http://schemas.openxmlformats.org/drawingml/2006/main" xmlns:r="http://schemas.openxmlformats.org/officeDocument/2006/relationships" xmlns:p="http://schemas.openxmlformats.org/presentationml/2006/main">
-  <p:cSld>
-    <p:spTree>
-      <p:nvGrpSpPr>
-        <p:cNvPr id="1" name=""/>
-        <p:cNvGrpSpPr/>
-        <p:nvPr/>
-      </p:nvGrpSpPr>
-      <p:grpSpPr>
-        <a:xfrm>
-          <a:off x="0" y="0"/>
-          <a:ext cx="0" cy="0"/>
-          <a:chOff x="0" y="0"/>
-          <a:chExt cx="0" cy="0"/>
-        </a:xfrm>
-      </p:grpSpPr>
-      <p:sp>
-        <p:nvSpPr>
-          <p:cNvPr id="2" name="Título 1">
-            <a:extLst>
-              <a:ext uri="{FF2B5EF4-FFF2-40B4-BE49-F238E27FC236}">
-                <a16:creationId xmlns:a16="http://schemas.microsoft.com/office/drawing/2014/main" id="{4C0225C4-B001-496B-9359-402CBC161880}"/>
-              </a:ext>
-            </a:extLst>
-          </p:cNvPr>
-          <p:cNvSpPr>
-            <a:spLocks noGrp="1"/>
-          </p:cNvSpPr>
-          <p:nvPr>
-            <p:ph type="title"/>
-          </p:nvPr>
-        </p:nvSpPr>
-        <p:spPr/>
-        <p:txBody>
-          <a:bodyPr>
-            <a:normAutofit fontScale="90000"/>
-          </a:bodyPr>
-          <a:lstStyle/>
-          <a:p>
-            <a:r>
-              <a:rPr lang="pt-BR" dirty="0"/>
-              <a:t>Bloco de Atraso</a:t>
-            </a:r>
-          </a:p>
-        </p:txBody>
-      </p:sp>
-      <p:sp>
-        <p:nvSpPr>
-          <p:cNvPr id="5" name="Espaço Reservado para Número de Slide 4">
-            <a:extLst>
-              <a:ext uri="{FF2B5EF4-FFF2-40B4-BE49-F238E27FC236}">
-                <a16:creationId xmlns:a16="http://schemas.microsoft.com/office/drawing/2014/main" id="{5D6FE3A7-D322-4C61-8A80-7D7F6BAF4980}"/>
-              </a:ext>
-            </a:extLst>
-          </p:cNvPr>
-          <p:cNvSpPr>
-            <a:spLocks noGrp="1"/>
-          </p:cNvSpPr>
-          <p:nvPr>
-            <p:ph type="sldNum" sz="quarter" idx="15"/>
-          </p:nvPr>
-        </p:nvSpPr>
-        <p:spPr/>
-        <p:txBody>
-          <a:bodyPr/>
-          <a:lstStyle/>
-          <a:p>
-            <a:fld id="{A16978B4-287B-0541-9C5D-483DA783F6CF}" type="slidenum">
-              <a:rPr lang="en-US" smtClean="0"/>
-              <a:t>9</a:t>
-            </a:fld>
-            <a:endParaRPr lang="en-US" dirty="0"/>
-          </a:p>
-        </p:txBody>
-      </p:sp>
-      <p:sp>
-        <p:nvSpPr>
-          <p:cNvPr id="7" name="Rectangle 2">
-            <a:extLst>
-              <a:ext uri="{FF2B5EF4-FFF2-40B4-BE49-F238E27FC236}">
-                <a16:creationId xmlns:a16="http://schemas.microsoft.com/office/drawing/2014/main" id="{C244C7D5-1E6A-4F2A-B3AB-DB2CCB5F8278}"/>
-              </a:ext>
-            </a:extLst>
-          </p:cNvPr>
-          <p:cNvSpPr>
-            <a:spLocks noGrp="1" noChangeArrowheads="1"/>
-          </p:cNvSpPr>
-          <p:nvPr>
-            <p:ph type="body" sz="quarter" idx="14"/>
-          </p:nvPr>
-        </p:nvSpPr>
-        <p:spPr bwMode="auto">
-          <a:xfrm>
-            <a:off x="239184" y="1700970"/>
-            <a:ext cx="8831264" cy="3416320"/>
-          </a:xfrm>
-          <a:prstGeom prst="rect">
-            <a:avLst/>
-          </a:prstGeom>
-          <a:noFill/>
-          <a:ln>
-            <a:noFill/>
-          </a:ln>
-          <a:effectLst/>
-          <a:extLst>
-            <a:ext uri="{909E8E84-426E-40DD-AFC4-6F175D3DCCD1}">
-              <a14:hiddenFill xmlns:a14="http://schemas.microsoft.com/office/drawing/2010/main">
-                <a:solidFill>
-                  <a:schemeClr val="accent1"/>
-                </a:solidFill>
-              </a14:hiddenFill>
-            </a:ext>
-            <a:ext uri="{91240B29-F687-4F45-9708-019B960494DF}">
-              <a14:hiddenLine xmlns:a14="http://schemas.microsoft.com/office/drawing/2010/main" w="9525">
-                <a:solidFill>
-                  <a:schemeClr val="tx1"/>
-                </a:solidFill>
-                <a:miter lim="800000"/>
-                <a:headEnd/>
-                <a:tailEnd/>
-              </a14:hiddenLine>
-            </a:ext>
-            <a:ext uri="{AF507438-7753-43E0-B8FC-AC1667EBCBE1}">
-              <a14:hiddenEffects xmlns:a14="http://schemas.microsoft.com/office/drawing/2010/main">
-                <a:effectLst>
-                  <a:outerShdw dist="35921" dir="2700000" algn="ctr" rotWithShape="0">
-                    <a:schemeClr val="bg2"/>
-                  </a:outerShdw>
-                </a:effectLst>
-              </a14:hiddenEffects>
-            </a:ext>
-          </a:extLst>
-        </p:spPr>
-        <p:txBody>
-          <a:bodyPr vert="horz" wrap="none" lIns="91440" tIns="45720" rIns="91440" bIns="45720" numCol="1" anchor="ctr" anchorCtr="0" compatLnSpc="1">
-            <a:prstTxWarp prst="textNoShape">
-              <a:avLst/>
-            </a:prstTxWarp>
-            <a:spAutoFit/>
-          </a:bodyPr>
-          <a:lstStyle/>
-          <a:p>
-            <a:pPr marL="0" marR="0" lvl="0" indent="0" algn="l" defTabSz="914400" rtl="0" eaLnBrk="0" fontAlgn="base" latinLnBrk="0" hangingPunct="0">
-              <a:lnSpc>
-                <a:spcPct val="100000"/>
-              </a:lnSpc>
-              <a:spcBef>
-                <a:spcPct val="0"/>
-              </a:spcBef>
-              <a:spcAft>
-                <a:spcPct val="0"/>
-              </a:spcAft>
-              <a:buClrTx/>
-              <a:buSzTx/>
-              <a:buFontTx/>
-              <a:buChar char="•"/>
-              <a:tabLst/>
-            </a:pPr>
-            <a:r>
-              <a:rPr kumimoji="0" lang="pt-BR" altLang="pt-BR" sz="1800" b="1" i="0" u="none" strike="noStrike" cap="none" normalizeH="0" baseline="0" dirty="0">
-                <a:ln>
-                  <a:noFill/>
-                </a:ln>
-                <a:solidFill>
-                  <a:schemeClr val="tx1"/>
-                </a:solidFill>
-                <a:effectLst/>
-                <a:latin typeface="Arial" panose="020B0604020202020204" pitchFamily="34" charset="0"/>
-              </a:rPr>
-              <a:t>Símbolo:</a:t>
-            </a:r>
-            <a:r>
-              <a:rPr kumimoji="0" lang="pt-BR" altLang="pt-BR" sz="1800" b="0" i="0" u="none" strike="noStrike" cap="none" normalizeH="0" baseline="0" dirty="0">
-                <a:ln>
-                  <a:noFill/>
-                </a:ln>
-                <a:solidFill>
-                  <a:schemeClr val="tx1"/>
-                </a:solidFill>
-                <a:effectLst/>
-                <a:latin typeface="Arial" panose="020B0604020202020204" pitchFamily="34" charset="0"/>
-              </a:rPr>
-              <a:t> z⁻ᵏ</a:t>
-            </a:r>
-          </a:p>
-          <a:p>
-            <a:pPr marL="0" marR="0" lvl="0" indent="0" algn="l" defTabSz="914400" rtl="0" eaLnBrk="0" fontAlgn="base" latinLnBrk="0" hangingPunct="0">
-              <a:lnSpc>
-                <a:spcPct val="100000"/>
-              </a:lnSpc>
-              <a:spcBef>
-                <a:spcPct val="0"/>
-              </a:spcBef>
-              <a:spcAft>
-                <a:spcPct val="0"/>
-              </a:spcAft>
-              <a:buClrTx/>
-              <a:buSzTx/>
-              <a:tabLst/>
-            </a:pPr>
-            <a:endParaRPr kumimoji="0" lang="pt-BR" altLang="pt-BR" sz="1800" b="0" i="0" u="none" strike="noStrike" cap="none" normalizeH="0" baseline="0" dirty="0">
-              <a:ln>
-                <a:noFill/>
-              </a:ln>
-              <a:solidFill>
-                <a:schemeClr val="tx1"/>
-              </a:solidFill>
-              <a:effectLst/>
-              <a:latin typeface="Arial" panose="020B0604020202020204" pitchFamily="34" charset="0"/>
-            </a:endParaRPr>
-          </a:p>
-          <a:p>
-            <a:pPr marL="0" marR="0" lvl="0" indent="0" algn="l" defTabSz="914400" rtl="0" eaLnBrk="0" fontAlgn="base" latinLnBrk="0" hangingPunct="0">
-              <a:lnSpc>
-                <a:spcPct val="100000"/>
-              </a:lnSpc>
-              <a:spcBef>
-                <a:spcPct val="0"/>
-              </a:spcBef>
-              <a:spcAft>
-                <a:spcPct val="0"/>
-              </a:spcAft>
-              <a:buClrTx/>
-              <a:buSzTx/>
-              <a:buFontTx/>
-              <a:buChar char="•"/>
-              <a:tabLst/>
-            </a:pPr>
-            <a:r>
-              <a:rPr kumimoji="0" lang="pt-BR" altLang="pt-BR" sz="1800" b="1" i="0" u="none" strike="noStrike" cap="none" normalizeH="0" baseline="0" dirty="0">
-                <a:ln>
-                  <a:noFill/>
-                </a:ln>
-                <a:solidFill>
-                  <a:schemeClr val="tx1"/>
-                </a:solidFill>
-                <a:effectLst/>
-                <a:latin typeface="Arial" panose="020B0604020202020204" pitchFamily="34" charset="0"/>
-              </a:rPr>
-              <a:t>Função:</a:t>
-            </a:r>
-            <a:br>
-              <a:rPr kumimoji="0" lang="pt-BR" altLang="pt-BR" sz="1800" b="0" i="0" u="none" strike="noStrike" cap="none" normalizeH="0" baseline="0" dirty="0">
-                <a:ln>
-                  <a:noFill/>
-                </a:ln>
-                <a:solidFill>
-                  <a:schemeClr val="tx1"/>
-                </a:solidFill>
-                <a:effectLst/>
-                <a:latin typeface="Arial" panose="020B0604020202020204" pitchFamily="34" charset="0"/>
-              </a:rPr>
-            </a:br>
-            <a:r>
-              <a:rPr kumimoji="0" lang="pt-BR" altLang="pt-BR" sz="1800" b="0" i="0" u="none" strike="noStrike" cap="none" normalizeH="0" baseline="0" dirty="0">
-                <a:ln>
-                  <a:noFill/>
-                </a:ln>
-                <a:solidFill>
-                  <a:schemeClr val="tx1"/>
-                </a:solidFill>
-                <a:effectLst/>
-                <a:latin typeface="Arial" panose="020B0604020202020204" pitchFamily="34" charset="0"/>
-              </a:rPr>
-              <a:t>Introduz um </a:t>
-            </a:r>
-            <a:r>
-              <a:rPr kumimoji="0" lang="pt-BR" altLang="pt-BR" sz="1800" b="1" i="0" u="none" strike="noStrike" cap="none" normalizeH="0" baseline="0" dirty="0">
-                <a:ln>
-                  <a:noFill/>
-                </a:ln>
-                <a:solidFill>
-                  <a:schemeClr val="tx1"/>
-                </a:solidFill>
-                <a:effectLst/>
-                <a:latin typeface="Arial" panose="020B0604020202020204" pitchFamily="34" charset="0"/>
-              </a:rPr>
-              <a:t>deslocamento temporal controlado</a:t>
-            </a:r>
-            <a:r>
-              <a:rPr kumimoji="0" lang="pt-BR" altLang="pt-BR" sz="1800" b="0" i="0" u="none" strike="noStrike" cap="none" normalizeH="0" baseline="0" dirty="0">
-                <a:ln>
-                  <a:noFill/>
-                </a:ln>
-                <a:solidFill>
-                  <a:schemeClr val="tx1"/>
-                </a:solidFill>
-                <a:effectLst/>
-                <a:latin typeface="Arial" panose="020B0604020202020204" pitchFamily="34" charset="0"/>
-              </a:rPr>
-              <a:t> no sinal.</a:t>
-            </a:r>
-          </a:p>
-          <a:p>
-            <a:pPr marL="0" marR="0" lvl="0" indent="0" algn="l" defTabSz="914400" rtl="0" eaLnBrk="0" fontAlgn="base" latinLnBrk="0" hangingPunct="0">
-              <a:lnSpc>
-                <a:spcPct val="100000"/>
-              </a:lnSpc>
-              <a:spcBef>
-                <a:spcPct val="0"/>
-              </a:spcBef>
-              <a:spcAft>
-                <a:spcPct val="0"/>
-              </a:spcAft>
-              <a:buClrTx/>
-              <a:buSzTx/>
-              <a:tabLst/>
-            </a:pPr>
-            <a:endParaRPr kumimoji="0" lang="pt-BR" altLang="pt-BR" sz="1800" b="0" i="0" u="none" strike="noStrike" cap="none" normalizeH="0" baseline="0" dirty="0">
-              <a:ln>
-                <a:noFill/>
-              </a:ln>
-              <a:solidFill>
-                <a:schemeClr val="tx1"/>
-              </a:solidFill>
-              <a:effectLst/>
-              <a:latin typeface="Arial" panose="020B0604020202020204" pitchFamily="34" charset="0"/>
-            </a:endParaRPr>
-          </a:p>
-          <a:p>
-            <a:pPr marL="0" marR="0" lvl="0" indent="0" algn="l" defTabSz="914400" rtl="0" eaLnBrk="0" fontAlgn="base" latinLnBrk="0" hangingPunct="0">
-              <a:lnSpc>
-                <a:spcPct val="100000"/>
-              </a:lnSpc>
-              <a:spcBef>
-                <a:spcPct val="0"/>
-              </a:spcBef>
-              <a:spcAft>
-                <a:spcPct val="0"/>
-              </a:spcAft>
-              <a:buClrTx/>
-              <a:buSzTx/>
-              <a:buFontTx/>
-              <a:buChar char="•"/>
-              <a:tabLst/>
-            </a:pPr>
-            <a:r>
-              <a:rPr kumimoji="0" lang="pt-BR" altLang="pt-BR" sz="1800" b="1" i="0" u="none" strike="noStrike" cap="none" normalizeH="0" baseline="0" dirty="0">
-                <a:ln>
-                  <a:noFill/>
-                </a:ln>
-                <a:solidFill>
-                  <a:schemeClr val="tx1"/>
-                </a:solidFill>
-                <a:effectLst/>
-                <a:latin typeface="Arial" panose="020B0604020202020204" pitchFamily="34" charset="0"/>
-              </a:rPr>
-              <a:t>Importância no QMF:</a:t>
-            </a:r>
-            <a:endParaRPr kumimoji="0" lang="pt-BR" altLang="pt-BR" sz="1800" b="0" i="0" u="none" strike="noStrike" cap="none" normalizeH="0" baseline="0" dirty="0">
-              <a:ln>
-                <a:noFill/>
-              </a:ln>
-              <a:solidFill>
-                <a:schemeClr val="tx1"/>
-              </a:solidFill>
-              <a:effectLst/>
-              <a:latin typeface="Arial" panose="020B0604020202020204" pitchFamily="34" charset="0"/>
-            </a:endParaRPr>
-          </a:p>
-          <a:p>
-            <a:pPr lvl="1" defTabSz="914400" eaLnBrk="0" fontAlgn="base" hangingPunct="0">
-              <a:lnSpc>
-                <a:spcPct val="100000"/>
-              </a:lnSpc>
-              <a:spcBef>
-                <a:spcPct val="0"/>
-              </a:spcBef>
-              <a:spcAft>
-                <a:spcPct val="0"/>
-              </a:spcAft>
-              <a:buFontTx/>
-              <a:buChar char="•"/>
-            </a:pPr>
-            <a:r>
-              <a:rPr kumimoji="0" lang="pt-BR" altLang="pt-BR" b="0" i="0" u="none" strike="noStrike" cap="none" normalizeH="0" baseline="0" dirty="0">
-                <a:ln>
-                  <a:noFill/>
-                </a:ln>
-                <a:solidFill>
-                  <a:schemeClr val="tx1"/>
-                </a:solidFill>
-                <a:effectLst/>
-                <a:latin typeface="Arial" panose="020B0604020202020204" pitchFamily="34" charset="0"/>
-              </a:rPr>
-              <a:t> Compensar </a:t>
-            </a:r>
-            <a:r>
-              <a:rPr kumimoji="0" lang="pt-BR" altLang="pt-BR" b="1" i="0" u="none" strike="noStrike" cap="none" normalizeH="0" baseline="0" dirty="0">
-                <a:ln>
-                  <a:noFill/>
-                </a:ln>
-                <a:solidFill>
-                  <a:schemeClr val="tx1"/>
-                </a:solidFill>
-                <a:effectLst/>
-                <a:latin typeface="Arial" panose="020B0604020202020204" pitchFamily="34" charset="0"/>
-              </a:rPr>
-              <a:t>diferenças de fase</a:t>
-            </a:r>
-            <a:r>
-              <a:rPr kumimoji="0" lang="pt-BR" altLang="pt-BR" b="0" i="0" u="none" strike="noStrike" cap="none" normalizeH="0" baseline="0" dirty="0">
-                <a:ln>
-                  <a:noFill/>
-                </a:ln>
-                <a:solidFill>
-                  <a:schemeClr val="tx1"/>
-                </a:solidFill>
-                <a:effectLst/>
-                <a:latin typeface="Arial" panose="020B0604020202020204" pitchFamily="34" charset="0"/>
-              </a:rPr>
-              <a:t> entre </a:t>
-            </a:r>
-            <a:r>
-              <a:rPr kumimoji="0" lang="pt-BR" altLang="pt-BR" b="0" i="0" u="none" strike="noStrike" cap="none" normalizeH="0" baseline="0" dirty="0" err="1">
-                <a:ln>
-                  <a:noFill/>
-                </a:ln>
-                <a:solidFill>
-                  <a:schemeClr val="tx1"/>
-                </a:solidFill>
-                <a:effectLst/>
-                <a:latin typeface="Arial" panose="020B0604020202020204" pitchFamily="34" charset="0"/>
-              </a:rPr>
-              <a:t>sub-bandas</a:t>
-            </a:r>
-            <a:r>
-              <a:rPr kumimoji="0" lang="pt-BR" altLang="pt-BR" b="0" i="0" u="none" strike="noStrike" cap="none" normalizeH="0" baseline="0" dirty="0">
-                <a:ln>
-                  <a:noFill/>
-                </a:ln>
-                <a:solidFill>
-                  <a:schemeClr val="tx1"/>
-                </a:solidFill>
-                <a:effectLst/>
-                <a:latin typeface="Arial" panose="020B0604020202020204" pitchFamily="34" charset="0"/>
-              </a:rPr>
-              <a:t>.</a:t>
-            </a:r>
-          </a:p>
-          <a:p>
-            <a:pPr lvl="1" defTabSz="914400" eaLnBrk="0" fontAlgn="base" hangingPunct="0">
-              <a:lnSpc>
-                <a:spcPct val="100000"/>
-              </a:lnSpc>
-              <a:spcBef>
-                <a:spcPct val="0"/>
-              </a:spcBef>
-              <a:spcAft>
-                <a:spcPct val="0"/>
-              </a:spcAft>
-              <a:buFontTx/>
-              <a:buChar char="•"/>
-            </a:pPr>
-            <a:r>
-              <a:rPr kumimoji="0" lang="pt-BR" altLang="pt-BR" b="0" i="0" u="none" strike="noStrike" cap="none" normalizeH="0" baseline="0" dirty="0">
-                <a:ln>
-                  <a:noFill/>
-                </a:ln>
-                <a:solidFill>
-                  <a:schemeClr val="tx1"/>
-                </a:solidFill>
-                <a:effectLst/>
-                <a:latin typeface="Arial" panose="020B0604020202020204" pitchFamily="34" charset="0"/>
-              </a:rPr>
-              <a:t> Garantir </a:t>
-            </a:r>
-            <a:r>
-              <a:rPr kumimoji="0" lang="pt-BR" altLang="pt-BR" b="1" i="0" u="none" strike="noStrike" cap="none" normalizeH="0" baseline="0" dirty="0">
-                <a:ln>
-                  <a:noFill/>
-                </a:ln>
-                <a:solidFill>
-                  <a:schemeClr val="tx1"/>
-                </a:solidFill>
-                <a:effectLst/>
-                <a:latin typeface="Arial" panose="020B0604020202020204" pitchFamily="34" charset="0"/>
-              </a:rPr>
-              <a:t>alinhamento temporal</a:t>
-            </a:r>
-            <a:r>
-              <a:rPr kumimoji="0" lang="pt-BR" altLang="pt-BR" b="0" i="0" u="none" strike="noStrike" cap="none" normalizeH="0" baseline="0" dirty="0">
-                <a:ln>
-                  <a:noFill/>
-                </a:ln>
-                <a:solidFill>
-                  <a:schemeClr val="tx1"/>
-                </a:solidFill>
-                <a:effectLst/>
-                <a:latin typeface="Arial" panose="020B0604020202020204" pitchFamily="34" charset="0"/>
-              </a:rPr>
-              <a:t> entre as componentes na recomposição.</a:t>
-            </a:r>
-          </a:p>
-          <a:p>
-            <a:pPr marL="0" marR="0" lvl="0" indent="0" algn="l" defTabSz="914400" rtl="0" eaLnBrk="0" fontAlgn="base" latinLnBrk="0" hangingPunct="0">
-              <a:lnSpc>
-                <a:spcPct val="100000"/>
-              </a:lnSpc>
-              <a:spcBef>
-                <a:spcPct val="0"/>
-              </a:spcBef>
-              <a:spcAft>
-                <a:spcPct val="0"/>
-              </a:spcAft>
-              <a:buClrTx/>
-              <a:buSzTx/>
-              <a:buFontTx/>
-              <a:buChar char="•"/>
-              <a:tabLst/>
-            </a:pPr>
-            <a:endParaRPr kumimoji="0" lang="pt-BR" altLang="pt-BR" sz="1800" b="1" i="0" u="none" strike="noStrike" cap="none" normalizeH="0" baseline="0" dirty="0">
-              <a:ln>
-                <a:noFill/>
-              </a:ln>
-              <a:solidFill>
-                <a:schemeClr val="tx1"/>
-              </a:solidFill>
-              <a:effectLst/>
-              <a:latin typeface="Arial" panose="020B0604020202020204" pitchFamily="34" charset="0"/>
-            </a:endParaRPr>
-          </a:p>
-          <a:p>
-            <a:pPr marL="0" marR="0" lvl="0" indent="0" algn="l" defTabSz="914400" rtl="0" eaLnBrk="0" fontAlgn="base" latinLnBrk="0" hangingPunct="0">
-              <a:lnSpc>
-                <a:spcPct val="100000"/>
-              </a:lnSpc>
-              <a:spcBef>
-                <a:spcPct val="0"/>
-              </a:spcBef>
-              <a:spcAft>
-                <a:spcPct val="0"/>
-              </a:spcAft>
-              <a:buClrTx/>
-              <a:buSzTx/>
-              <a:buFontTx/>
-              <a:buChar char="•"/>
-              <a:tabLst/>
-            </a:pPr>
-            <a:r>
-              <a:rPr kumimoji="0" lang="pt-BR" altLang="pt-BR" sz="1800" b="1" i="0" u="none" strike="noStrike" cap="none" normalizeH="0" baseline="0" dirty="0">
-                <a:ln>
-                  <a:noFill/>
-                </a:ln>
-                <a:solidFill>
-                  <a:schemeClr val="tx1"/>
-                </a:solidFill>
-                <a:effectLst/>
-                <a:latin typeface="Arial" panose="020B0604020202020204" pitchFamily="34" charset="0"/>
-              </a:rPr>
-              <a:t>Exemplo prático:</a:t>
-            </a:r>
-            <a:br>
-              <a:rPr kumimoji="0" lang="pt-BR" altLang="pt-BR" sz="1800" b="0" i="0" u="none" strike="noStrike" cap="none" normalizeH="0" baseline="0" dirty="0">
-                <a:ln>
-                  <a:noFill/>
-                </a:ln>
-                <a:solidFill>
-                  <a:schemeClr val="tx1"/>
-                </a:solidFill>
-                <a:effectLst/>
-                <a:latin typeface="Arial" panose="020B0604020202020204" pitchFamily="34" charset="0"/>
-              </a:rPr>
-            </a:br>
-            <a:r>
-              <a:rPr kumimoji="0" lang="pt-BR" altLang="pt-BR" sz="1800" b="0" i="0" u="none" strike="noStrike" cap="none" normalizeH="0" baseline="0" dirty="0">
-                <a:ln>
-                  <a:noFill/>
-                </a:ln>
-                <a:solidFill>
-                  <a:schemeClr val="tx1"/>
-                </a:solidFill>
-                <a:effectLst/>
-                <a:latin typeface="Arial" panose="020B0604020202020204" pitchFamily="34" charset="0"/>
-              </a:rPr>
-              <a:t>Se H₀(z) e H₁(z) introduzem atrasos diferentes, um bloco z⁻ᵏ ajusta a defasagem na </a:t>
-            </a:r>
-          </a:p>
-          <a:p>
-            <a:pPr marL="0" marR="0" lvl="0" indent="0" algn="l" defTabSz="914400" rtl="0" eaLnBrk="0" fontAlgn="base" latinLnBrk="0" hangingPunct="0">
-              <a:lnSpc>
-                <a:spcPct val="100000"/>
-              </a:lnSpc>
-              <a:spcBef>
-                <a:spcPct val="0"/>
-              </a:spcBef>
-              <a:spcAft>
-                <a:spcPct val="0"/>
-              </a:spcAft>
-              <a:buClrTx/>
-              <a:buSzTx/>
-              <a:tabLst/>
-            </a:pPr>
-            <a:r>
-              <a:rPr kumimoji="0" lang="pt-BR" altLang="pt-BR" sz="1800" b="0" i="0" u="none" strike="noStrike" cap="none" normalizeH="0" baseline="0" dirty="0">
-                <a:ln>
-                  <a:noFill/>
-                </a:ln>
-                <a:solidFill>
-                  <a:schemeClr val="tx1"/>
-                </a:solidFill>
-                <a:effectLst/>
-                <a:latin typeface="Arial" panose="020B0604020202020204" pitchFamily="34" charset="0"/>
-              </a:rPr>
-              <a:t>etapa de síntese.</a:t>
-            </a:r>
-          </a:p>
-        </p:txBody>
-      </p:sp>
-    </p:spTree>
-    <p:extLst>
-      <p:ext uri="{BB962C8B-B14F-4D97-AF65-F5344CB8AC3E}">
-        <p14:creationId xmlns:p14="http://schemas.microsoft.com/office/powerpoint/2010/main" val="2049782236"/>
       </p:ext>
     </p:extLst>
   </p:cSld>

</xml_diff>